<commit_message>
upto Lesson 4 of 6
</commit_message>
<xml_diff>
--- a/PBIID/PowerBI Int Dev slides Q1-2019-shared.pptx
+++ b/PBIID/PowerBI Int Dev slides Q1-2019-shared.pptx
@@ -5,7 +5,7 @@
     <p:sldMasterId id="2147483648" r:id="rId1"/>
   </p:sldMasterIdLst>
   <p:notesMasterIdLst>
-    <p:notesMasterId r:id="rId23"/>
+    <p:notesMasterId r:id="rId35"/>
   </p:notesMasterIdLst>
   <p:sldIdLst>
     <p:sldId id="270" r:id="rId2"/>
@@ -28,7 +28,19 @@
     <p:sldId id="286" r:id="rId19"/>
     <p:sldId id="285" r:id="rId20"/>
     <p:sldId id="289" r:id="rId21"/>
-    <p:sldId id="284" r:id="rId22"/>
+    <p:sldId id="295" r:id="rId22"/>
+    <p:sldId id="284" r:id="rId23"/>
+    <p:sldId id="277" r:id="rId24"/>
+    <p:sldId id="291" r:id="rId25"/>
+    <p:sldId id="279" r:id="rId26"/>
+    <p:sldId id="288" r:id="rId27"/>
+    <p:sldId id="287" r:id="rId28"/>
+    <p:sldId id="278" r:id="rId29"/>
+    <p:sldId id="298" r:id="rId30"/>
+    <p:sldId id="292" r:id="rId31"/>
+    <p:sldId id="297" r:id="rId32"/>
+    <p:sldId id="296" r:id="rId33"/>
+    <p:sldId id="294" r:id="rId34"/>
   </p:sldIdLst>
   <p:sldSz cx="12192000" cy="6858000"/>
   <p:notesSz cx="6858000" cy="9144000"/>
@@ -217,7 +229,7 @@
           <a:p>
             <a:fld id="{B843760A-9520-4BC0-B10F-C5CF685FC6EF}" type="datetimeFigureOut">
               <a:rPr lang="en-GB" smtClean="0"/>
-              <a:t>30/01/2019</a:t>
+              <a:t>08/02/2019</a:t>
             </a:fld>
             <a:endParaRPr lang="en-GB"/>
           </a:p>
@@ -697,18 +709,7 @@
           <a:bodyPr/>
           <a:lstStyle/>
           <a:p>
-            <a:r>
-              <a:rPr lang="en-GB" dirty="0"/>
-              <a:t>C:\Users\david\Documents\CurAct2017\2017_Study\PowerBI\Presentations\18_04 Dublin\</a:t>
-            </a:r>
-            <a:r>
-              <a:rPr lang="en-GB" dirty="0" err="1"/>
-              <a:t>Dublin_FinalPresentations</a:t>
-            </a:r>
-            <a:r>
-              <a:rPr lang="en-GB" dirty="0"/>
-              <a:t>\Streaming</a:t>
-            </a:r>
+            <a:endParaRPr lang="en-GB" dirty="0"/>
           </a:p>
         </p:txBody>
       </p:sp>
@@ -792,18 +793,7 @@
           <a:bodyPr/>
           <a:lstStyle/>
           <a:p>
-            <a:r>
-              <a:rPr lang="en-GB" dirty="0"/>
-              <a:t>C:\Users\david\Documents\CurAct2017\2017_Study\PowerBI\Presentations\18_04 Dublin\</a:t>
-            </a:r>
-            <a:r>
-              <a:rPr lang="en-GB" dirty="0" err="1"/>
-              <a:t>Dublin_FinalPresentations</a:t>
-            </a:r>
-            <a:r>
-              <a:rPr lang="en-GB" dirty="0"/>
-              <a:t>\Streaming</a:t>
-            </a:r>
+            <a:endParaRPr lang="en-GB" dirty="0"/>
           </a:p>
         </p:txBody>
       </p:sp>
@@ -887,18 +877,7 @@
           <a:bodyPr/>
           <a:lstStyle/>
           <a:p>
-            <a:r>
-              <a:rPr lang="en-GB" dirty="0"/>
-              <a:t>C:\Users\david\Documents\CurAct2017\2017_Study\PowerBI\Presentations\18_04 Dublin\</a:t>
-            </a:r>
-            <a:r>
-              <a:rPr lang="en-GB" dirty="0" err="1"/>
-              <a:t>Dublin_FinalPresentations</a:t>
-            </a:r>
-            <a:r>
-              <a:rPr lang="en-GB" dirty="0"/>
-              <a:t>\Streaming</a:t>
-            </a:r>
+            <a:endParaRPr lang="en-GB" dirty="0"/>
           </a:p>
         </p:txBody>
       </p:sp>
@@ -982,18 +961,7 @@
           <a:bodyPr/>
           <a:lstStyle/>
           <a:p>
-            <a:r>
-              <a:rPr lang="en-GB" dirty="0"/>
-              <a:t>C:\Users\david\Documents\CurAct2017\2017_Study\PowerBI\Presentations\18_04 Dublin\</a:t>
-            </a:r>
-            <a:r>
-              <a:rPr lang="en-GB" dirty="0" err="1"/>
-              <a:t>Dublin_FinalPresentations</a:t>
-            </a:r>
-            <a:r>
-              <a:rPr lang="en-GB" dirty="0"/>
-              <a:t>\Streaming</a:t>
-            </a:r>
+            <a:endParaRPr lang="en-GB" dirty="0"/>
           </a:p>
         </p:txBody>
       </p:sp>
@@ -1077,18 +1045,7 @@
           <a:bodyPr/>
           <a:lstStyle/>
           <a:p>
-            <a:r>
-              <a:rPr lang="en-GB" dirty="0"/>
-              <a:t>C:\Users\david\Documents\CurAct2017\2017_Study\PowerBI\Presentations\18_04 Dublin\</a:t>
-            </a:r>
-            <a:r>
-              <a:rPr lang="en-GB" dirty="0" err="1"/>
-              <a:t>Dublin_FinalPresentations</a:t>
-            </a:r>
-            <a:r>
-              <a:rPr lang="en-GB" dirty="0"/>
-              <a:t>\Streaming</a:t>
-            </a:r>
+            <a:endParaRPr lang="en-GB" dirty="0"/>
           </a:p>
         </p:txBody>
       </p:sp>
@@ -1118,7 +1075,357 @@
     </p:spTree>
     <p:extLst>
       <p:ext uri="{BB962C8B-B14F-4D97-AF65-F5344CB8AC3E}">
+        <p14:creationId xmlns:p14="http://schemas.microsoft.com/office/powerpoint/2010/main" val="170737127"/>
+      </p:ext>
+    </p:extLst>
+  </p:cSld>
+  <p:clrMapOvr>
+    <a:masterClrMapping/>
+  </p:clrMapOvr>
+</p:notes>
+</file>
+
+<file path=ppt/notesSlides/notesSlide16.xml><?xml version="1.0" encoding="utf-8"?>
+<p:notes xmlns:a="http://schemas.openxmlformats.org/drawingml/2006/main" xmlns:r="http://schemas.openxmlformats.org/officeDocument/2006/relationships" xmlns:p="http://schemas.openxmlformats.org/presentationml/2006/main">
+  <p:cSld>
+    <p:spTree>
+      <p:nvGrpSpPr>
+        <p:cNvPr id="1" name=""/>
+        <p:cNvGrpSpPr/>
+        <p:nvPr/>
+      </p:nvGrpSpPr>
+      <p:grpSpPr>
+        <a:xfrm>
+          <a:off x="0" y="0"/>
+          <a:ext cx="0" cy="0"/>
+          <a:chOff x="0" y="0"/>
+          <a:chExt cx="0" cy="0"/>
+        </a:xfrm>
+      </p:grpSpPr>
+      <p:sp>
+        <p:nvSpPr>
+          <p:cNvPr id="2" name="Slide Image Placeholder 1"/>
+          <p:cNvSpPr>
+            <a:spLocks noGrp="1" noRot="1" noChangeAspect="1"/>
+          </p:cNvSpPr>
+          <p:nvPr>
+            <p:ph type="sldImg"/>
+          </p:nvPr>
+        </p:nvSpPr>
+        <p:spPr/>
+      </p:sp>
+      <p:sp>
+        <p:nvSpPr>
+          <p:cNvPr id="3" name="Notes Placeholder 2"/>
+          <p:cNvSpPr>
+            <a:spLocks noGrp="1"/>
+          </p:cNvSpPr>
+          <p:nvPr>
+            <p:ph type="body" idx="1"/>
+          </p:nvPr>
+        </p:nvSpPr>
+        <p:spPr/>
+        <p:txBody>
+          <a:bodyPr/>
+          <a:lstStyle/>
+          <a:p>
+            <a:r>
+              <a:rPr lang="en-GB" dirty="0"/>
+              <a:t>C:\Users\david\Documents\CurAct2017\2017_Study\PowerBI\Presentations\18_04 Dublin\</a:t>
+            </a:r>
+            <a:r>
+              <a:rPr lang="en-GB" dirty="0" err="1"/>
+              <a:t>Dublin_FinalPresentations</a:t>
+            </a:r>
+            <a:r>
+              <a:rPr lang="en-GB" dirty="0"/>
+              <a:t>\Streaming</a:t>
+            </a:r>
+          </a:p>
+        </p:txBody>
+      </p:sp>
+      <p:sp>
+        <p:nvSpPr>
+          <p:cNvPr id="4" name="Slide Number Placeholder 3"/>
+          <p:cNvSpPr>
+            <a:spLocks noGrp="1"/>
+          </p:cNvSpPr>
+          <p:nvPr>
+            <p:ph type="sldNum" sz="quarter" idx="5"/>
+          </p:nvPr>
+        </p:nvSpPr>
+        <p:spPr/>
+        <p:txBody>
+          <a:bodyPr/>
+          <a:lstStyle/>
+          <a:p>
+            <a:fld id="{EBB36E36-5F05-4A8D-8B75-4C30BD81749B}" type="slidenum">
+              <a:rPr lang="en-GB" smtClean="0"/>
+              <a:t>22</a:t>
+            </a:fld>
+            <a:endParaRPr lang="en-GB"/>
+          </a:p>
+        </p:txBody>
+      </p:sp>
+    </p:spTree>
+    <p:extLst>
+      <p:ext uri="{BB962C8B-B14F-4D97-AF65-F5344CB8AC3E}">
         <p14:creationId xmlns:p14="http://schemas.microsoft.com/office/powerpoint/2010/main" val="3732162563"/>
+      </p:ext>
+    </p:extLst>
+  </p:cSld>
+  <p:clrMapOvr>
+    <a:masterClrMapping/>
+  </p:clrMapOvr>
+</p:notes>
+</file>
+
+<file path=ppt/notesSlides/notesSlide17.xml><?xml version="1.0" encoding="utf-8"?>
+<p:notes xmlns:a="http://schemas.openxmlformats.org/drawingml/2006/main" xmlns:r="http://schemas.openxmlformats.org/officeDocument/2006/relationships" xmlns:p="http://schemas.openxmlformats.org/presentationml/2006/main">
+  <p:cSld>
+    <p:spTree>
+      <p:nvGrpSpPr>
+        <p:cNvPr id="1" name=""/>
+        <p:cNvGrpSpPr/>
+        <p:nvPr/>
+      </p:nvGrpSpPr>
+      <p:grpSpPr>
+        <a:xfrm>
+          <a:off x="0" y="0"/>
+          <a:ext cx="0" cy="0"/>
+          <a:chOff x="0" y="0"/>
+          <a:chExt cx="0" cy="0"/>
+        </a:xfrm>
+      </p:grpSpPr>
+      <p:sp>
+        <p:nvSpPr>
+          <p:cNvPr id="2" name="Slide Image Placeholder 1"/>
+          <p:cNvSpPr>
+            <a:spLocks noGrp="1" noRot="1" noChangeAspect="1"/>
+          </p:cNvSpPr>
+          <p:nvPr>
+            <p:ph type="sldImg"/>
+          </p:nvPr>
+        </p:nvSpPr>
+        <p:spPr/>
+      </p:sp>
+      <p:sp>
+        <p:nvSpPr>
+          <p:cNvPr id="3" name="Notes Placeholder 2"/>
+          <p:cNvSpPr>
+            <a:spLocks noGrp="1"/>
+          </p:cNvSpPr>
+          <p:nvPr>
+            <p:ph type="body" idx="1"/>
+          </p:nvPr>
+        </p:nvSpPr>
+        <p:spPr/>
+        <p:txBody>
+          <a:bodyPr/>
+          <a:lstStyle/>
+          <a:p>
+            <a:r>
+              <a:rPr lang="en-GB" dirty="0"/>
+              <a:t>C:\Users\david\Documents\CurAct2017\2017_Study\PowerBI\Training\DNA Enterprise\UltimateBeginners18lesson2hour\Data-and-resource-downloads</a:t>
+            </a:r>
+          </a:p>
+        </p:txBody>
+      </p:sp>
+      <p:sp>
+        <p:nvSpPr>
+          <p:cNvPr id="4" name="Slide Number Placeholder 3"/>
+          <p:cNvSpPr>
+            <a:spLocks noGrp="1"/>
+          </p:cNvSpPr>
+          <p:nvPr>
+            <p:ph type="sldNum" sz="quarter" idx="5"/>
+          </p:nvPr>
+        </p:nvSpPr>
+        <p:spPr/>
+        <p:txBody>
+          <a:bodyPr/>
+          <a:lstStyle/>
+          <a:p>
+            <a:fld id="{EBB36E36-5F05-4A8D-8B75-4C30BD81749B}" type="slidenum">
+              <a:rPr lang="en-GB" smtClean="0"/>
+              <a:t>23</a:t>
+            </a:fld>
+            <a:endParaRPr lang="en-GB"/>
+          </a:p>
+        </p:txBody>
+      </p:sp>
+    </p:spTree>
+    <p:extLst>
+      <p:ext uri="{BB962C8B-B14F-4D97-AF65-F5344CB8AC3E}">
+        <p14:creationId xmlns:p14="http://schemas.microsoft.com/office/powerpoint/2010/main" val="1315226330"/>
+      </p:ext>
+    </p:extLst>
+  </p:cSld>
+  <p:clrMapOvr>
+    <a:masterClrMapping/>
+  </p:clrMapOvr>
+</p:notes>
+</file>
+
+<file path=ppt/notesSlides/notesSlide18.xml><?xml version="1.0" encoding="utf-8"?>
+<p:notes xmlns:a="http://schemas.openxmlformats.org/drawingml/2006/main" xmlns:r="http://schemas.openxmlformats.org/officeDocument/2006/relationships" xmlns:p="http://schemas.openxmlformats.org/presentationml/2006/main">
+  <p:cSld>
+    <p:spTree>
+      <p:nvGrpSpPr>
+        <p:cNvPr id="1" name=""/>
+        <p:cNvGrpSpPr/>
+        <p:nvPr/>
+      </p:nvGrpSpPr>
+      <p:grpSpPr>
+        <a:xfrm>
+          <a:off x="0" y="0"/>
+          <a:ext cx="0" cy="0"/>
+          <a:chOff x="0" y="0"/>
+          <a:chExt cx="0" cy="0"/>
+        </a:xfrm>
+      </p:grpSpPr>
+      <p:sp>
+        <p:nvSpPr>
+          <p:cNvPr id="2" name="Slide Image Placeholder 1"/>
+          <p:cNvSpPr>
+            <a:spLocks noGrp="1" noRot="1" noChangeAspect="1"/>
+          </p:cNvSpPr>
+          <p:nvPr>
+            <p:ph type="sldImg"/>
+          </p:nvPr>
+        </p:nvSpPr>
+        <p:spPr/>
+      </p:sp>
+      <p:sp>
+        <p:nvSpPr>
+          <p:cNvPr id="3" name="Notes Placeholder 2"/>
+          <p:cNvSpPr>
+            <a:spLocks noGrp="1"/>
+          </p:cNvSpPr>
+          <p:nvPr>
+            <p:ph type="body" idx="1"/>
+          </p:nvPr>
+        </p:nvSpPr>
+        <p:spPr/>
+        <p:txBody>
+          <a:bodyPr/>
+          <a:lstStyle/>
+          <a:p>
+            <a:endParaRPr lang="en-GB" dirty="0"/>
+          </a:p>
+        </p:txBody>
+      </p:sp>
+      <p:sp>
+        <p:nvSpPr>
+          <p:cNvPr id="4" name="Slide Number Placeholder 3"/>
+          <p:cNvSpPr>
+            <a:spLocks noGrp="1"/>
+          </p:cNvSpPr>
+          <p:nvPr>
+            <p:ph type="sldNum" sz="quarter" idx="5"/>
+          </p:nvPr>
+        </p:nvSpPr>
+        <p:spPr/>
+        <p:txBody>
+          <a:bodyPr/>
+          <a:lstStyle/>
+          <a:p>
+            <a:fld id="{EBB36E36-5F05-4A8D-8B75-4C30BD81749B}" type="slidenum">
+              <a:rPr lang="en-GB" smtClean="0"/>
+              <a:t>24</a:t>
+            </a:fld>
+            <a:endParaRPr lang="en-GB"/>
+          </a:p>
+        </p:txBody>
+      </p:sp>
+    </p:spTree>
+    <p:extLst>
+      <p:ext uri="{BB962C8B-B14F-4D97-AF65-F5344CB8AC3E}">
+        <p14:creationId xmlns:p14="http://schemas.microsoft.com/office/powerpoint/2010/main" val="2771143125"/>
+      </p:ext>
+    </p:extLst>
+  </p:cSld>
+  <p:clrMapOvr>
+    <a:masterClrMapping/>
+  </p:clrMapOvr>
+</p:notes>
+</file>
+
+<file path=ppt/notesSlides/notesSlide19.xml><?xml version="1.0" encoding="utf-8"?>
+<p:notes xmlns:a="http://schemas.openxmlformats.org/drawingml/2006/main" xmlns:r="http://schemas.openxmlformats.org/officeDocument/2006/relationships" xmlns:p="http://schemas.openxmlformats.org/presentationml/2006/main">
+  <p:cSld>
+    <p:spTree>
+      <p:nvGrpSpPr>
+        <p:cNvPr id="1" name=""/>
+        <p:cNvGrpSpPr/>
+        <p:nvPr/>
+      </p:nvGrpSpPr>
+      <p:grpSpPr>
+        <a:xfrm>
+          <a:off x="0" y="0"/>
+          <a:ext cx="0" cy="0"/>
+          <a:chOff x="0" y="0"/>
+          <a:chExt cx="0" cy="0"/>
+        </a:xfrm>
+      </p:grpSpPr>
+      <p:sp>
+        <p:nvSpPr>
+          <p:cNvPr id="2" name="Slide Image Placeholder 1"/>
+          <p:cNvSpPr>
+            <a:spLocks noGrp="1" noRot="1" noChangeAspect="1"/>
+          </p:cNvSpPr>
+          <p:nvPr>
+            <p:ph type="sldImg"/>
+          </p:nvPr>
+        </p:nvSpPr>
+        <p:spPr/>
+      </p:sp>
+      <p:sp>
+        <p:nvSpPr>
+          <p:cNvPr id="3" name="Notes Placeholder 2"/>
+          <p:cNvSpPr>
+            <a:spLocks noGrp="1"/>
+          </p:cNvSpPr>
+          <p:nvPr>
+            <p:ph type="body" idx="1"/>
+          </p:nvPr>
+        </p:nvSpPr>
+        <p:spPr/>
+        <p:txBody>
+          <a:bodyPr/>
+          <a:lstStyle/>
+          <a:p>
+            <a:endParaRPr lang="en-GB" dirty="0"/>
+          </a:p>
+        </p:txBody>
+      </p:sp>
+      <p:sp>
+        <p:nvSpPr>
+          <p:cNvPr id="4" name="Slide Number Placeholder 3"/>
+          <p:cNvSpPr>
+            <a:spLocks noGrp="1"/>
+          </p:cNvSpPr>
+          <p:nvPr>
+            <p:ph type="sldNum" sz="quarter" idx="5"/>
+          </p:nvPr>
+        </p:nvSpPr>
+        <p:spPr/>
+        <p:txBody>
+          <a:bodyPr/>
+          <a:lstStyle/>
+          <a:p>
+            <a:fld id="{EBB36E36-5F05-4A8D-8B75-4C30BD81749B}" type="slidenum">
+              <a:rPr lang="en-GB" smtClean="0"/>
+              <a:t>25</a:t>
+            </a:fld>
+            <a:endParaRPr lang="en-GB"/>
+          </a:p>
+        </p:txBody>
+      </p:sp>
+    </p:spTree>
+    <p:extLst>
+      <p:ext uri="{BB962C8B-B14F-4D97-AF65-F5344CB8AC3E}">
+        <p14:creationId xmlns:p14="http://schemas.microsoft.com/office/powerpoint/2010/main" val="924274842"/>
       </p:ext>
     </p:extLst>
   </p:cSld>
@@ -1203,6 +1510,678 @@
     <p:extLst>
       <p:ext uri="{BB962C8B-B14F-4D97-AF65-F5344CB8AC3E}">
         <p14:creationId xmlns:p14="http://schemas.microsoft.com/office/powerpoint/2010/main" val="192457743"/>
+      </p:ext>
+    </p:extLst>
+  </p:cSld>
+  <p:clrMapOvr>
+    <a:masterClrMapping/>
+  </p:clrMapOvr>
+</p:notes>
+</file>
+
+<file path=ppt/notesSlides/notesSlide20.xml><?xml version="1.0" encoding="utf-8"?>
+<p:notes xmlns:a="http://schemas.openxmlformats.org/drawingml/2006/main" xmlns:r="http://schemas.openxmlformats.org/officeDocument/2006/relationships" xmlns:p="http://schemas.openxmlformats.org/presentationml/2006/main">
+  <p:cSld>
+    <p:spTree>
+      <p:nvGrpSpPr>
+        <p:cNvPr id="1" name=""/>
+        <p:cNvGrpSpPr/>
+        <p:nvPr/>
+      </p:nvGrpSpPr>
+      <p:grpSpPr>
+        <a:xfrm>
+          <a:off x="0" y="0"/>
+          <a:ext cx="0" cy="0"/>
+          <a:chOff x="0" y="0"/>
+          <a:chExt cx="0" cy="0"/>
+        </a:xfrm>
+      </p:grpSpPr>
+      <p:sp>
+        <p:nvSpPr>
+          <p:cNvPr id="2" name="Slide Image Placeholder 1"/>
+          <p:cNvSpPr>
+            <a:spLocks noGrp="1" noRot="1" noChangeAspect="1"/>
+          </p:cNvSpPr>
+          <p:nvPr>
+            <p:ph type="sldImg"/>
+          </p:nvPr>
+        </p:nvSpPr>
+        <p:spPr/>
+      </p:sp>
+      <p:sp>
+        <p:nvSpPr>
+          <p:cNvPr id="3" name="Notes Placeholder 2"/>
+          <p:cNvSpPr>
+            <a:spLocks noGrp="1"/>
+          </p:cNvSpPr>
+          <p:nvPr>
+            <p:ph type="body" idx="1"/>
+          </p:nvPr>
+        </p:nvSpPr>
+        <p:spPr/>
+        <p:txBody>
+          <a:bodyPr/>
+          <a:lstStyle/>
+          <a:p>
+            <a:endParaRPr lang="en-GB" dirty="0"/>
+          </a:p>
+        </p:txBody>
+      </p:sp>
+      <p:sp>
+        <p:nvSpPr>
+          <p:cNvPr id="4" name="Slide Number Placeholder 3"/>
+          <p:cNvSpPr>
+            <a:spLocks noGrp="1"/>
+          </p:cNvSpPr>
+          <p:nvPr>
+            <p:ph type="sldNum" sz="quarter" idx="5"/>
+          </p:nvPr>
+        </p:nvSpPr>
+        <p:spPr/>
+        <p:txBody>
+          <a:bodyPr/>
+          <a:lstStyle/>
+          <a:p>
+            <a:fld id="{EBB36E36-5F05-4A8D-8B75-4C30BD81749B}" type="slidenum">
+              <a:rPr lang="en-GB" smtClean="0"/>
+              <a:t>26</a:t>
+            </a:fld>
+            <a:endParaRPr lang="en-GB"/>
+          </a:p>
+        </p:txBody>
+      </p:sp>
+    </p:spTree>
+    <p:extLst>
+      <p:ext uri="{BB962C8B-B14F-4D97-AF65-F5344CB8AC3E}">
+        <p14:creationId xmlns:p14="http://schemas.microsoft.com/office/powerpoint/2010/main" val="927883831"/>
+      </p:ext>
+    </p:extLst>
+  </p:cSld>
+  <p:clrMapOvr>
+    <a:masterClrMapping/>
+  </p:clrMapOvr>
+</p:notes>
+</file>
+
+<file path=ppt/notesSlides/notesSlide21.xml><?xml version="1.0" encoding="utf-8"?>
+<p:notes xmlns:a="http://schemas.openxmlformats.org/drawingml/2006/main" xmlns:r="http://schemas.openxmlformats.org/officeDocument/2006/relationships" xmlns:p="http://schemas.openxmlformats.org/presentationml/2006/main">
+  <p:cSld>
+    <p:spTree>
+      <p:nvGrpSpPr>
+        <p:cNvPr id="1" name=""/>
+        <p:cNvGrpSpPr/>
+        <p:nvPr/>
+      </p:nvGrpSpPr>
+      <p:grpSpPr>
+        <a:xfrm>
+          <a:off x="0" y="0"/>
+          <a:ext cx="0" cy="0"/>
+          <a:chOff x="0" y="0"/>
+          <a:chExt cx="0" cy="0"/>
+        </a:xfrm>
+      </p:grpSpPr>
+      <p:sp>
+        <p:nvSpPr>
+          <p:cNvPr id="2" name="Slide Image Placeholder 1"/>
+          <p:cNvSpPr>
+            <a:spLocks noGrp="1" noRot="1" noChangeAspect="1"/>
+          </p:cNvSpPr>
+          <p:nvPr>
+            <p:ph type="sldImg"/>
+          </p:nvPr>
+        </p:nvSpPr>
+        <p:spPr/>
+      </p:sp>
+      <p:sp>
+        <p:nvSpPr>
+          <p:cNvPr id="3" name="Notes Placeholder 2"/>
+          <p:cNvSpPr>
+            <a:spLocks noGrp="1"/>
+          </p:cNvSpPr>
+          <p:nvPr>
+            <p:ph type="body" idx="1"/>
+          </p:nvPr>
+        </p:nvSpPr>
+        <p:spPr/>
+        <p:txBody>
+          <a:bodyPr/>
+          <a:lstStyle/>
+          <a:p>
+            <a:endParaRPr lang="en-GB" dirty="0"/>
+          </a:p>
+        </p:txBody>
+      </p:sp>
+      <p:sp>
+        <p:nvSpPr>
+          <p:cNvPr id="4" name="Slide Number Placeholder 3"/>
+          <p:cNvSpPr>
+            <a:spLocks noGrp="1"/>
+          </p:cNvSpPr>
+          <p:nvPr>
+            <p:ph type="sldNum" sz="quarter" idx="5"/>
+          </p:nvPr>
+        </p:nvSpPr>
+        <p:spPr/>
+        <p:txBody>
+          <a:bodyPr/>
+          <a:lstStyle/>
+          <a:p>
+            <a:fld id="{EBB36E36-5F05-4A8D-8B75-4C30BD81749B}" type="slidenum">
+              <a:rPr lang="en-GB" smtClean="0"/>
+              <a:t>27</a:t>
+            </a:fld>
+            <a:endParaRPr lang="en-GB"/>
+          </a:p>
+        </p:txBody>
+      </p:sp>
+    </p:spTree>
+    <p:extLst>
+      <p:ext uri="{BB962C8B-B14F-4D97-AF65-F5344CB8AC3E}">
+        <p14:creationId xmlns:p14="http://schemas.microsoft.com/office/powerpoint/2010/main" val="3359187957"/>
+      </p:ext>
+    </p:extLst>
+  </p:cSld>
+  <p:clrMapOvr>
+    <a:masterClrMapping/>
+  </p:clrMapOvr>
+</p:notes>
+</file>
+
+<file path=ppt/notesSlides/notesSlide22.xml><?xml version="1.0" encoding="utf-8"?>
+<p:notes xmlns:a="http://schemas.openxmlformats.org/drawingml/2006/main" xmlns:r="http://schemas.openxmlformats.org/officeDocument/2006/relationships" xmlns:p="http://schemas.openxmlformats.org/presentationml/2006/main">
+  <p:cSld>
+    <p:spTree>
+      <p:nvGrpSpPr>
+        <p:cNvPr id="1" name=""/>
+        <p:cNvGrpSpPr/>
+        <p:nvPr/>
+      </p:nvGrpSpPr>
+      <p:grpSpPr>
+        <a:xfrm>
+          <a:off x="0" y="0"/>
+          <a:ext cx="0" cy="0"/>
+          <a:chOff x="0" y="0"/>
+          <a:chExt cx="0" cy="0"/>
+        </a:xfrm>
+      </p:grpSpPr>
+      <p:sp>
+        <p:nvSpPr>
+          <p:cNvPr id="2" name="Slide Image Placeholder 1"/>
+          <p:cNvSpPr>
+            <a:spLocks noGrp="1" noRot="1" noChangeAspect="1"/>
+          </p:cNvSpPr>
+          <p:nvPr>
+            <p:ph type="sldImg"/>
+          </p:nvPr>
+        </p:nvSpPr>
+        <p:spPr/>
+      </p:sp>
+      <p:sp>
+        <p:nvSpPr>
+          <p:cNvPr id="3" name="Notes Placeholder 2"/>
+          <p:cNvSpPr>
+            <a:spLocks noGrp="1"/>
+          </p:cNvSpPr>
+          <p:nvPr>
+            <p:ph type="body" idx="1"/>
+          </p:nvPr>
+        </p:nvSpPr>
+        <p:spPr/>
+        <p:txBody>
+          <a:bodyPr/>
+          <a:lstStyle/>
+          <a:p>
+            <a:endParaRPr lang="en-GB" dirty="0"/>
+          </a:p>
+        </p:txBody>
+      </p:sp>
+      <p:sp>
+        <p:nvSpPr>
+          <p:cNvPr id="4" name="Slide Number Placeholder 3"/>
+          <p:cNvSpPr>
+            <a:spLocks noGrp="1"/>
+          </p:cNvSpPr>
+          <p:nvPr>
+            <p:ph type="sldNum" sz="quarter" idx="5"/>
+          </p:nvPr>
+        </p:nvSpPr>
+        <p:spPr/>
+        <p:txBody>
+          <a:bodyPr/>
+          <a:lstStyle/>
+          <a:p>
+            <a:fld id="{EBB36E36-5F05-4A8D-8B75-4C30BD81749B}" type="slidenum">
+              <a:rPr lang="en-GB" smtClean="0"/>
+              <a:t>28</a:t>
+            </a:fld>
+            <a:endParaRPr lang="en-GB"/>
+          </a:p>
+        </p:txBody>
+      </p:sp>
+    </p:spTree>
+    <p:extLst>
+      <p:ext uri="{BB962C8B-B14F-4D97-AF65-F5344CB8AC3E}">
+        <p14:creationId xmlns:p14="http://schemas.microsoft.com/office/powerpoint/2010/main" val="370439244"/>
+      </p:ext>
+    </p:extLst>
+  </p:cSld>
+  <p:clrMapOvr>
+    <a:masterClrMapping/>
+  </p:clrMapOvr>
+</p:notes>
+</file>
+
+<file path=ppt/notesSlides/notesSlide23.xml><?xml version="1.0" encoding="utf-8"?>
+<p:notes xmlns:a="http://schemas.openxmlformats.org/drawingml/2006/main" xmlns:r="http://schemas.openxmlformats.org/officeDocument/2006/relationships" xmlns:p="http://schemas.openxmlformats.org/presentationml/2006/main">
+  <p:cSld>
+    <p:spTree>
+      <p:nvGrpSpPr>
+        <p:cNvPr id="1" name=""/>
+        <p:cNvGrpSpPr/>
+        <p:nvPr/>
+      </p:nvGrpSpPr>
+      <p:grpSpPr>
+        <a:xfrm>
+          <a:off x="0" y="0"/>
+          <a:ext cx="0" cy="0"/>
+          <a:chOff x="0" y="0"/>
+          <a:chExt cx="0" cy="0"/>
+        </a:xfrm>
+      </p:grpSpPr>
+      <p:sp>
+        <p:nvSpPr>
+          <p:cNvPr id="2" name="Slide Image Placeholder 1"/>
+          <p:cNvSpPr>
+            <a:spLocks noGrp="1" noRot="1" noChangeAspect="1"/>
+          </p:cNvSpPr>
+          <p:nvPr>
+            <p:ph type="sldImg"/>
+          </p:nvPr>
+        </p:nvSpPr>
+        <p:spPr/>
+      </p:sp>
+      <p:sp>
+        <p:nvSpPr>
+          <p:cNvPr id="3" name="Notes Placeholder 2"/>
+          <p:cNvSpPr>
+            <a:spLocks noGrp="1"/>
+          </p:cNvSpPr>
+          <p:nvPr>
+            <p:ph type="body" idx="1"/>
+          </p:nvPr>
+        </p:nvSpPr>
+        <p:spPr/>
+        <p:txBody>
+          <a:bodyPr/>
+          <a:lstStyle/>
+          <a:p>
+            <a:endParaRPr lang="en-GB" dirty="0"/>
+          </a:p>
+        </p:txBody>
+      </p:sp>
+      <p:sp>
+        <p:nvSpPr>
+          <p:cNvPr id="4" name="Slide Number Placeholder 3"/>
+          <p:cNvSpPr>
+            <a:spLocks noGrp="1"/>
+          </p:cNvSpPr>
+          <p:nvPr>
+            <p:ph type="sldNum" sz="quarter" idx="5"/>
+          </p:nvPr>
+        </p:nvSpPr>
+        <p:spPr/>
+        <p:txBody>
+          <a:bodyPr/>
+          <a:lstStyle/>
+          <a:p>
+            <a:fld id="{EBB36E36-5F05-4A8D-8B75-4C30BD81749B}" type="slidenum">
+              <a:rPr lang="en-GB" smtClean="0"/>
+              <a:t>29</a:t>
+            </a:fld>
+            <a:endParaRPr lang="en-GB"/>
+          </a:p>
+        </p:txBody>
+      </p:sp>
+    </p:spTree>
+    <p:extLst>
+      <p:ext uri="{BB962C8B-B14F-4D97-AF65-F5344CB8AC3E}">
+        <p14:creationId xmlns:p14="http://schemas.microsoft.com/office/powerpoint/2010/main" val="3691254017"/>
+      </p:ext>
+    </p:extLst>
+  </p:cSld>
+  <p:clrMapOvr>
+    <a:masterClrMapping/>
+  </p:clrMapOvr>
+</p:notes>
+</file>
+
+<file path=ppt/notesSlides/notesSlide24.xml><?xml version="1.0" encoding="utf-8"?>
+<p:notes xmlns:a="http://schemas.openxmlformats.org/drawingml/2006/main" xmlns:r="http://schemas.openxmlformats.org/officeDocument/2006/relationships" xmlns:p="http://schemas.openxmlformats.org/presentationml/2006/main">
+  <p:cSld>
+    <p:spTree>
+      <p:nvGrpSpPr>
+        <p:cNvPr id="1" name=""/>
+        <p:cNvGrpSpPr/>
+        <p:nvPr/>
+      </p:nvGrpSpPr>
+      <p:grpSpPr>
+        <a:xfrm>
+          <a:off x="0" y="0"/>
+          <a:ext cx="0" cy="0"/>
+          <a:chOff x="0" y="0"/>
+          <a:chExt cx="0" cy="0"/>
+        </a:xfrm>
+      </p:grpSpPr>
+      <p:sp>
+        <p:nvSpPr>
+          <p:cNvPr id="2" name="Slide Image Placeholder 1"/>
+          <p:cNvSpPr>
+            <a:spLocks noGrp="1" noRot="1" noChangeAspect="1"/>
+          </p:cNvSpPr>
+          <p:nvPr>
+            <p:ph type="sldImg"/>
+          </p:nvPr>
+        </p:nvSpPr>
+        <p:spPr/>
+      </p:sp>
+      <p:sp>
+        <p:nvSpPr>
+          <p:cNvPr id="3" name="Notes Placeholder 2"/>
+          <p:cNvSpPr>
+            <a:spLocks noGrp="1"/>
+          </p:cNvSpPr>
+          <p:nvPr>
+            <p:ph type="body" idx="1"/>
+          </p:nvPr>
+        </p:nvSpPr>
+        <p:spPr/>
+        <p:txBody>
+          <a:bodyPr/>
+          <a:lstStyle/>
+          <a:p>
+            <a:endParaRPr lang="en-GB" dirty="0"/>
+          </a:p>
+        </p:txBody>
+      </p:sp>
+      <p:sp>
+        <p:nvSpPr>
+          <p:cNvPr id="4" name="Slide Number Placeholder 3"/>
+          <p:cNvSpPr>
+            <a:spLocks noGrp="1"/>
+          </p:cNvSpPr>
+          <p:nvPr>
+            <p:ph type="sldNum" sz="quarter" idx="5"/>
+          </p:nvPr>
+        </p:nvSpPr>
+        <p:spPr/>
+        <p:txBody>
+          <a:bodyPr/>
+          <a:lstStyle/>
+          <a:p>
+            <a:fld id="{EBB36E36-5F05-4A8D-8B75-4C30BD81749B}" type="slidenum">
+              <a:rPr lang="en-GB" smtClean="0"/>
+              <a:t>30</a:t>
+            </a:fld>
+            <a:endParaRPr lang="en-GB"/>
+          </a:p>
+        </p:txBody>
+      </p:sp>
+    </p:spTree>
+    <p:extLst>
+      <p:ext uri="{BB962C8B-B14F-4D97-AF65-F5344CB8AC3E}">
+        <p14:creationId xmlns:p14="http://schemas.microsoft.com/office/powerpoint/2010/main" val="522867657"/>
+      </p:ext>
+    </p:extLst>
+  </p:cSld>
+  <p:clrMapOvr>
+    <a:masterClrMapping/>
+  </p:clrMapOvr>
+</p:notes>
+</file>
+
+<file path=ppt/notesSlides/notesSlide25.xml><?xml version="1.0" encoding="utf-8"?>
+<p:notes xmlns:a="http://schemas.openxmlformats.org/drawingml/2006/main" xmlns:r="http://schemas.openxmlformats.org/officeDocument/2006/relationships" xmlns:p="http://schemas.openxmlformats.org/presentationml/2006/main">
+  <p:cSld>
+    <p:spTree>
+      <p:nvGrpSpPr>
+        <p:cNvPr id="1" name=""/>
+        <p:cNvGrpSpPr/>
+        <p:nvPr/>
+      </p:nvGrpSpPr>
+      <p:grpSpPr>
+        <a:xfrm>
+          <a:off x="0" y="0"/>
+          <a:ext cx="0" cy="0"/>
+          <a:chOff x="0" y="0"/>
+          <a:chExt cx="0" cy="0"/>
+        </a:xfrm>
+      </p:grpSpPr>
+      <p:sp>
+        <p:nvSpPr>
+          <p:cNvPr id="2" name="Slide Image Placeholder 1"/>
+          <p:cNvSpPr>
+            <a:spLocks noGrp="1" noRot="1" noChangeAspect="1"/>
+          </p:cNvSpPr>
+          <p:nvPr>
+            <p:ph type="sldImg"/>
+          </p:nvPr>
+        </p:nvSpPr>
+        <p:spPr/>
+      </p:sp>
+      <p:sp>
+        <p:nvSpPr>
+          <p:cNvPr id="3" name="Notes Placeholder 2"/>
+          <p:cNvSpPr>
+            <a:spLocks noGrp="1"/>
+          </p:cNvSpPr>
+          <p:nvPr>
+            <p:ph type="body" idx="1"/>
+          </p:nvPr>
+        </p:nvSpPr>
+        <p:spPr/>
+        <p:txBody>
+          <a:bodyPr/>
+          <a:lstStyle/>
+          <a:p>
+            <a:endParaRPr lang="en-GB" dirty="0"/>
+          </a:p>
+        </p:txBody>
+      </p:sp>
+      <p:sp>
+        <p:nvSpPr>
+          <p:cNvPr id="4" name="Slide Number Placeholder 3"/>
+          <p:cNvSpPr>
+            <a:spLocks noGrp="1"/>
+          </p:cNvSpPr>
+          <p:nvPr>
+            <p:ph type="sldNum" sz="quarter" idx="5"/>
+          </p:nvPr>
+        </p:nvSpPr>
+        <p:spPr/>
+        <p:txBody>
+          <a:bodyPr/>
+          <a:lstStyle/>
+          <a:p>
+            <a:fld id="{EBB36E36-5F05-4A8D-8B75-4C30BD81749B}" type="slidenum">
+              <a:rPr lang="en-GB" smtClean="0"/>
+              <a:t>31</a:t>
+            </a:fld>
+            <a:endParaRPr lang="en-GB"/>
+          </a:p>
+        </p:txBody>
+      </p:sp>
+    </p:spTree>
+    <p:extLst>
+      <p:ext uri="{BB962C8B-B14F-4D97-AF65-F5344CB8AC3E}">
+        <p14:creationId xmlns:p14="http://schemas.microsoft.com/office/powerpoint/2010/main" val="3166562621"/>
+      </p:ext>
+    </p:extLst>
+  </p:cSld>
+  <p:clrMapOvr>
+    <a:masterClrMapping/>
+  </p:clrMapOvr>
+</p:notes>
+</file>
+
+<file path=ppt/notesSlides/notesSlide26.xml><?xml version="1.0" encoding="utf-8"?>
+<p:notes xmlns:a="http://schemas.openxmlformats.org/drawingml/2006/main" xmlns:r="http://schemas.openxmlformats.org/officeDocument/2006/relationships" xmlns:p="http://schemas.openxmlformats.org/presentationml/2006/main">
+  <p:cSld>
+    <p:spTree>
+      <p:nvGrpSpPr>
+        <p:cNvPr id="1" name=""/>
+        <p:cNvGrpSpPr/>
+        <p:nvPr/>
+      </p:nvGrpSpPr>
+      <p:grpSpPr>
+        <a:xfrm>
+          <a:off x="0" y="0"/>
+          <a:ext cx="0" cy="0"/>
+          <a:chOff x="0" y="0"/>
+          <a:chExt cx="0" cy="0"/>
+        </a:xfrm>
+      </p:grpSpPr>
+      <p:sp>
+        <p:nvSpPr>
+          <p:cNvPr id="2" name="Slide Image Placeholder 1"/>
+          <p:cNvSpPr>
+            <a:spLocks noGrp="1" noRot="1" noChangeAspect="1"/>
+          </p:cNvSpPr>
+          <p:nvPr>
+            <p:ph type="sldImg"/>
+          </p:nvPr>
+        </p:nvSpPr>
+        <p:spPr/>
+      </p:sp>
+      <p:sp>
+        <p:nvSpPr>
+          <p:cNvPr id="3" name="Notes Placeholder 2"/>
+          <p:cNvSpPr>
+            <a:spLocks noGrp="1"/>
+          </p:cNvSpPr>
+          <p:nvPr>
+            <p:ph type="body" idx="1"/>
+          </p:nvPr>
+        </p:nvSpPr>
+        <p:spPr/>
+        <p:txBody>
+          <a:bodyPr/>
+          <a:lstStyle/>
+          <a:p>
+            <a:endParaRPr lang="en-GB" dirty="0"/>
+          </a:p>
+        </p:txBody>
+      </p:sp>
+      <p:sp>
+        <p:nvSpPr>
+          <p:cNvPr id="4" name="Slide Number Placeholder 3"/>
+          <p:cNvSpPr>
+            <a:spLocks noGrp="1"/>
+          </p:cNvSpPr>
+          <p:nvPr>
+            <p:ph type="sldNum" sz="quarter" idx="5"/>
+          </p:nvPr>
+        </p:nvSpPr>
+        <p:spPr/>
+        <p:txBody>
+          <a:bodyPr/>
+          <a:lstStyle/>
+          <a:p>
+            <a:fld id="{EBB36E36-5F05-4A8D-8B75-4C30BD81749B}" type="slidenum">
+              <a:rPr lang="en-GB" smtClean="0"/>
+              <a:t>32</a:t>
+            </a:fld>
+            <a:endParaRPr lang="en-GB"/>
+          </a:p>
+        </p:txBody>
+      </p:sp>
+    </p:spTree>
+    <p:extLst>
+      <p:ext uri="{BB962C8B-B14F-4D97-AF65-F5344CB8AC3E}">
+        <p14:creationId xmlns:p14="http://schemas.microsoft.com/office/powerpoint/2010/main" val="3777899884"/>
+      </p:ext>
+    </p:extLst>
+  </p:cSld>
+  <p:clrMapOvr>
+    <a:masterClrMapping/>
+  </p:clrMapOvr>
+</p:notes>
+</file>
+
+<file path=ppt/notesSlides/notesSlide27.xml><?xml version="1.0" encoding="utf-8"?>
+<p:notes xmlns:a="http://schemas.openxmlformats.org/drawingml/2006/main" xmlns:r="http://schemas.openxmlformats.org/officeDocument/2006/relationships" xmlns:p="http://schemas.openxmlformats.org/presentationml/2006/main">
+  <p:cSld>
+    <p:spTree>
+      <p:nvGrpSpPr>
+        <p:cNvPr id="1" name=""/>
+        <p:cNvGrpSpPr/>
+        <p:nvPr/>
+      </p:nvGrpSpPr>
+      <p:grpSpPr>
+        <a:xfrm>
+          <a:off x="0" y="0"/>
+          <a:ext cx="0" cy="0"/>
+          <a:chOff x="0" y="0"/>
+          <a:chExt cx="0" cy="0"/>
+        </a:xfrm>
+      </p:grpSpPr>
+      <p:sp>
+        <p:nvSpPr>
+          <p:cNvPr id="2" name="Slide Image Placeholder 1"/>
+          <p:cNvSpPr>
+            <a:spLocks noGrp="1" noRot="1" noChangeAspect="1"/>
+          </p:cNvSpPr>
+          <p:nvPr>
+            <p:ph type="sldImg"/>
+          </p:nvPr>
+        </p:nvSpPr>
+        <p:spPr/>
+      </p:sp>
+      <p:sp>
+        <p:nvSpPr>
+          <p:cNvPr id="3" name="Notes Placeholder 2"/>
+          <p:cNvSpPr>
+            <a:spLocks noGrp="1"/>
+          </p:cNvSpPr>
+          <p:nvPr>
+            <p:ph type="body" idx="1"/>
+          </p:nvPr>
+        </p:nvSpPr>
+        <p:spPr/>
+        <p:txBody>
+          <a:bodyPr/>
+          <a:lstStyle/>
+          <a:p>
+            <a:endParaRPr lang="en-GB" dirty="0"/>
+          </a:p>
+        </p:txBody>
+      </p:sp>
+      <p:sp>
+        <p:nvSpPr>
+          <p:cNvPr id="4" name="Slide Number Placeholder 3"/>
+          <p:cNvSpPr>
+            <a:spLocks noGrp="1"/>
+          </p:cNvSpPr>
+          <p:nvPr>
+            <p:ph type="sldNum" sz="quarter" idx="5"/>
+          </p:nvPr>
+        </p:nvSpPr>
+        <p:spPr/>
+        <p:txBody>
+          <a:bodyPr/>
+          <a:lstStyle/>
+          <a:p>
+            <a:fld id="{EBB36E36-5F05-4A8D-8B75-4C30BD81749B}" type="slidenum">
+              <a:rPr lang="en-GB" smtClean="0"/>
+              <a:t>33</a:t>
+            </a:fld>
+            <a:endParaRPr lang="en-GB"/>
+          </a:p>
+        </p:txBody>
+      </p:sp>
+    </p:spTree>
+    <p:extLst>
+      <p:ext uri="{BB962C8B-B14F-4D97-AF65-F5344CB8AC3E}">
+        <p14:creationId xmlns:p14="http://schemas.microsoft.com/office/powerpoint/2010/main" val="1165681388"/>
       </p:ext>
     </p:extLst>
   </p:cSld>
@@ -2147,7 +3126,7 @@
           <a:p>
             <a:fld id="{E5D7BA62-63A5-4D0D-BF80-A1F4909EFF75}" type="datetimeFigureOut">
               <a:rPr lang="en-GB" smtClean="0"/>
-              <a:t>30/01/2019</a:t>
+              <a:t>08/02/2019</a:t>
             </a:fld>
             <a:endParaRPr lang="en-GB"/>
           </a:p>
@@ -2357,7 +3336,7 @@
           <a:p>
             <a:fld id="{E5D7BA62-63A5-4D0D-BF80-A1F4909EFF75}" type="datetimeFigureOut">
               <a:rPr lang="en-GB" smtClean="0"/>
-              <a:t>30/01/2019</a:t>
+              <a:t>08/02/2019</a:t>
             </a:fld>
             <a:endParaRPr lang="en-GB"/>
           </a:p>
@@ -2635,7 +3614,7 @@
           <a:p>
             <a:fld id="{E5D7BA62-63A5-4D0D-BF80-A1F4909EFF75}" type="datetimeFigureOut">
               <a:rPr lang="en-GB" smtClean="0"/>
-              <a:t>30/01/2019</a:t>
+              <a:t>08/02/2019</a:t>
             </a:fld>
             <a:endParaRPr lang="en-GB"/>
           </a:p>
@@ -2911,7 +3890,7 @@
           <a:p>
             <a:fld id="{E5D7BA62-63A5-4D0D-BF80-A1F4909EFF75}" type="datetimeFigureOut">
               <a:rPr lang="en-GB" smtClean="0"/>
-              <a:t>30/01/2019</a:t>
+              <a:t>08/02/2019</a:t>
             </a:fld>
             <a:endParaRPr lang="en-GB"/>
           </a:p>
@@ -3179,7 +4158,7 @@
           <a:p>
             <a:fld id="{E5D7BA62-63A5-4D0D-BF80-A1F4909EFF75}" type="datetimeFigureOut">
               <a:rPr lang="en-GB" smtClean="0"/>
-              <a:t>30/01/2019</a:t>
+              <a:t>08/02/2019</a:t>
             </a:fld>
             <a:endParaRPr lang="en-GB"/>
           </a:p>
@@ -3594,7 +4573,7 @@
           <a:p>
             <a:fld id="{E5D7BA62-63A5-4D0D-BF80-A1F4909EFF75}" type="datetimeFigureOut">
               <a:rPr lang="en-GB" smtClean="0"/>
-              <a:t>30/01/2019</a:t>
+              <a:t>08/02/2019</a:t>
             </a:fld>
             <a:endParaRPr lang="en-GB"/>
           </a:p>
@@ -3736,7 +4715,7 @@
           <a:p>
             <a:fld id="{E5D7BA62-63A5-4D0D-BF80-A1F4909EFF75}" type="datetimeFigureOut">
               <a:rPr lang="en-GB" smtClean="0"/>
-              <a:t>30/01/2019</a:t>
+              <a:t>08/02/2019</a:t>
             </a:fld>
             <a:endParaRPr lang="en-GB"/>
           </a:p>
@@ -3849,7 +4828,7 @@
           <a:p>
             <a:fld id="{E5D7BA62-63A5-4D0D-BF80-A1F4909EFF75}" type="datetimeFigureOut">
               <a:rPr lang="en-GB" smtClean="0"/>
-              <a:t>30/01/2019</a:t>
+              <a:t>08/02/2019</a:t>
             </a:fld>
             <a:endParaRPr lang="en-GB"/>
           </a:p>
@@ -4162,7 +5141,7 @@
           <a:p>
             <a:fld id="{E5D7BA62-63A5-4D0D-BF80-A1F4909EFF75}" type="datetimeFigureOut">
               <a:rPr lang="en-GB" smtClean="0"/>
-              <a:t>30/01/2019</a:t>
+              <a:t>08/02/2019</a:t>
             </a:fld>
             <a:endParaRPr lang="en-GB"/>
           </a:p>
@@ -4451,7 +5430,7 @@
           <a:p>
             <a:fld id="{E5D7BA62-63A5-4D0D-BF80-A1F4909EFF75}" type="datetimeFigureOut">
               <a:rPr lang="en-GB" smtClean="0"/>
-              <a:t>30/01/2019</a:t>
+              <a:t>08/02/2019</a:t>
             </a:fld>
             <a:endParaRPr lang="en-GB"/>
           </a:p>
@@ -4694,7 +5673,7 @@
           <a:p>
             <a:fld id="{E5D7BA62-63A5-4D0D-BF80-A1F4909EFF75}" type="datetimeFigureOut">
               <a:rPr lang="en-GB" smtClean="0"/>
-              <a:t>30/01/2019</a:t>
+              <a:t>08/02/2019</a:t>
             </a:fld>
             <a:endParaRPr lang="en-GB"/>
           </a:p>
@@ -9958,7 +10937,7 @@
           <a:p>
             <a:r>
               <a:rPr lang="en-GB" dirty="0"/>
-              <a:t>Power BI Real time datasets: Streaming</a:t>
+              <a:t>Power BI Lesson 4 of 6</a:t>
             </a:r>
           </a:p>
         </p:txBody>
@@ -9992,6 +10971,445 @@
           <a:lstStyle/>
           <a:p>
             <a:pPr algn="l"/>
+            <a:endParaRPr lang="en-GB" dirty="0"/>
+          </a:p>
+          <a:p>
+            <a:pPr algn="l"/>
+            <a:endParaRPr lang="en-GB" dirty="0"/>
+          </a:p>
+          <a:p>
+            <a:pPr algn="l"/>
+            <a:endParaRPr lang="en-GB" dirty="0"/>
+          </a:p>
+        </p:txBody>
+      </p:sp>
+      <p:sp>
+        <p:nvSpPr>
+          <p:cNvPr id="4" name="Subtitle 2">
+            <a:extLst>
+              <a:ext uri="{FF2B5EF4-FFF2-40B4-BE49-F238E27FC236}">
+                <a16:creationId xmlns:a16="http://schemas.microsoft.com/office/drawing/2014/main" id="{0EF62DD6-25EE-491D-8957-EB6046F9F8D1}"/>
+              </a:ext>
+            </a:extLst>
+          </p:cNvPr>
+          <p:cNvSpPr txBox="1">
+            <a:spLocks/>
+          </p:cNvSpPr>
+          <p:nvPr/>
+        </p:nvSpPr>
+        <p:spPr>
+          <a:xfrm>
+            <a:off x="1676400" y="1216071"/>
+            <a:ext cx="9144000" cy="4435867"/>
+          </a:xfrm>
+          <a:prstGeom prst="rect">
+            <a:avLst/>
+          </a:prstGeom>
+        </p:spPr>
+        <p:txBody>
+          <a:bodyPr vert="horz" lIns="91440" tIns="45720" rIns="91440" bIns="45720" rtlCol="0">
+            <a:normAutofit/>
+          </a:bodyPr>
+          <a:lstStyle>
+            <a:lvl1pPr marL="0" indent="0" algn="ctr" defTabSz="914400" rtl="0" eaLnBrk="1" latinLnBrk="0" hangingPunct="1">
+              <a:lnSpc>
+                <a:spcPct val="90000"/>
+              </a:lnSpc>
+              <a:spcBef>
+                <a:spcPts val="1000"/>
+              </a:spcBef>
+              <a:buFont typeface="Arial" panose="020B0604020202020204" pitchFamily="34" charset="0"/>
+              <a:buNone/>
+              <a:defRPr sz="2400" kern="1200">
+                <a:solidFill>
+                  <a:schemeClr val="tx1"/>
+                </a:solidFill>
+                <a:latin typeface="+mn-lt"/>
+                <a:ea typeface="+mn-ea"/>
+                <a:cs typeface="+mn-cs"/>
+              </a:defRPr>
+            </a:lvl1pPr>
+            <a:lvl2pPr marL="457200" indent="0" algn="ctr" defTabSz="914400" rtl="0" eaLnBrk="1" latinLnBrk="0" hangingPunct="1">
+              <a:lnSpc>
+                <a:spcPct val="90000"/>
+              </a:lnSpc>
+              <a:spcBef>
+                <a:spcPts val="500"/>
+              </a:spcBef>
+              <a:buFont typeface="Arial" panose="020B0604020202020204" pitchFamily="34" charset="0"/>
+              <a:buNone/>
+              <a:defRPr sz="2000" kern="1200">
+                <a:solidFill>
+                  <a:schemeClr val="tx1"/>
+                </a:solidFill>
+                <a:latin typeface="+mn-lt"/>
+                <a:ea typeface="+mn-ea"/>
+                <a:cs typeface="+mn-cs"/>
+              </a:defRPr>
+            </a:lvl2pPr>
+            <a:lvl3pPr marL="914400" indent="0" algn="ctr" defTabSz="914400" rtl="0" eaLnBrk="1" latinLnBrk="0" hangingPunct="1">
+              <a:lnSpc>
+                <a:spcPct val="90000"/>
+              </a:lnSpc>
+              <a:spcBef>
+                <a:spcPts val="500"/>
+              </a:spcBef>
+              <a:buFont typeface="Arial" panose="020B0604020202020204" pitchFamily="34" charset="0"/>
+              <a:buNone/>
+              <a:defRPr sz="1800" kern="1200">
+                <a:solidFill>
+                  <a:schemeClr val="tx1"/>
+                </a:solidFill>
+                <a:latin typeface="+mn-lt"/>
+                <a:ea typeface="+mn-ea"/>
+                <a:cs typeface="+mn-cs"/>
+              </a:defRPr>
+            </a:lvl3pPr>
+            <a:lvl4pPr marL="1371600" indent="0" algn="ctr" defTabSz="914400" rtl="0" eaLnBrk="1" latinLnBrk="0" hangingPunct="1">
+              <a:lnSpc>
+                <a:spcPct val="90000"/>
+              </a:lnSpc>
+              <a:spcBef>
+                <a:spcPts val="500"/>
+              </a:spcBef>
+              <a:buFont typeface="Arial" panose="020B0604020202020204" pitchFamily="34" charset="0"/>
+              <a:buNone/>
+              <a:defRPr sz="1600" kern="1200">
+                <a:solidFill>
+                  <a:schemeClr val="tx1"/>
+                </a:solidFill>
+                <a:latin typeface="+mn-lt"/>
+                <a:ea typeface="+mn-ea"/>
+                <a:cs typeface="+mn-cs"/>
+              </a:defRPr>
+            </a:lvl4pPr>
+            <a:lvl5pPr marL="1828800" indent="0" algn="ctr" defTabSz="914400" rtl="0" eaLnBrk="1" latinLnBrk="0" hangingPunct="1">
+              <a:lnSpc>
+                <a:spcPct val="90000"/>
+              </a:lnSpc>
+              <a:spcBef>
+                <a:spcPts val="500"/>
+              </a:spcBef>
+              <a:buFont typeface="Arial" panose="020B0604020202020204" pitchFamily="34" charset="0"/>
+              <a:buNone/>
+              <a:defRPr sz="1600" kern="1200">
+                <a:solidFill>
+                  <a:schemeClr val="tx1"/>
+                </a:solidFill>
+                <a:latin typeface="+mn-lt"/>
+                <a:ea typeface="+mn-ea"/>
+                <a:cs typeface="+mn-cs"/>
+              </a:defRPr>
+            </a:lvl5pPr>
+            <a:lvl6pPr marL="2286000" indent="0" algn="ctr" defTabSz="914400" rtl="0" eaLnBrk="1" latinLnBrk="0" hangingPunct="1">
+              <a:lnSpc>
+                <a:spcPct val="90000"/>
+              </a:lnSpc>
+              <a:spcBef>
+                <a:spcPts val="500"/>
+              </a:spcBef>
+              <a:buFont typeface="Arial" panose="020B0604020202020204" pitchFamily="34" charset="0"/>
+              <a:buNone/>
+              <a:defRPr sz="1600" kern="1200">
+                <a:solidFill>
+                  <a:schemeClr val="tx1"/>
+                </a:solidFill>
+                <a:latin typeface="+mn-lt"/>
+                <a:ea typeface="+mn-ea"/>
+                <a:cs typeface="+mn-cs"/>
+              </a:defRPr>
+            </a:lvl6pPr>
+            <a:lvl7pPr marL="2743200" indent="0" algn="ctr" defTabSz="914400" rtl="0" eaLnBrk="1" latinLnBrk="0" hangingPunct="1">
+              <a:lnSpc>
+                <a:spcPct val="90000"/>
+              </a:lnSpc>
+              <a:spcBef>
+                <a:spcPts val="500"/>
+              </a:spcBef>
+              <a:buFont typeface="Arial" panose="020B0604020202020204" pitchFamily="34" charset="0"/>
+              <a:buNone/>
+              <a:defRPr sz="1600" kern="1200">
+                <a:solidFill>
+                  <a:schemeClr val="tx1"/>
+                </a:solidFill>
+                <a:latin typeface="+mn-lt"/>
+                <a:ea typeface="+mn-ea"/>
+                <a:cs typeface="+mn-cs"/>
+              </a:defRPr>
+            </a:lvl7pPr>
+            <a:lvl8pPr marL="3200400" indent="0" algn="ctr" defTabSz="914400" rtl="0" eaLnBrk="1" latinLnBrk="0" hangingPunct="1">
+              <a:lnSpc>
+                <a:spcPct val="90000"/>
+              </a:lnSpc>
+              <a:spcBef>
+                <a:spcPts val="500"/>
+              </a:spcBef>
+              <a:buFont typeface="Arial" panose="020B0604020202020204" pitchFamily="34" charset="0"/>
+              <a:buNone/>
+              <a:defRPr sz="1600" kern="1200">
+                <a:solidFill>
+                  <a:schemeClr val="tx1"/>
+                </a:solidFill>
+                <a:latin typeface="+mn-lt"/>
+                <a:ea typeface="+mn-ea"/>
+                <a:cs typeface="+mn-cs"/>
+              </a:defRPr>
+            </a:lvl8pPr>
+            <a:lvl9pPr marL="3657600" indent="0" algn="ctr" defTabSz="914400" rtl="0" eaLnBrk="1" latinLnBrk="0" hangingPunct="1">
+              <a:lnSpc>
+                <a:spcPct val="90000"/>
+              </a:lnSpc>
+              <a:spcBef>
+                <a:spcPts val="500"/>
+              </a:spcBef>
+              <a:buFont typeface="Arial" panose="020B0604020202020204" pitchFamily="34" charset="0"/>
+              <a:buNone/>
+              <a:defRPr sz="1600" kern="1200">
+                <a:solidFill>
+                  <a:schemeClr val="tx1"/>
+                </a:solidFill>
+                <a:latin typeface="+mn-lt"/>
+                <a:ea typeface="+mn-ea"/>
+                <a:cs typeface="+mn-cs"/>
+              </a:defRPr>
+            </a:lvl9pPr>
+          </a:lstStyle>
+          <a:p>
+            <a:pPr algn="l"/>
+            <a:endParaRPr lang="en-GB" dirty="0"/>
+          </a:p>
+          <a:p>
+            <a:pPr algn="l"/>
+            <a:endParaRPr lang="en-GB" dirty="0"/>
+          </a:p>
+          <a:p>
+            <a:pPr algn="l"/>
+            <a:endParaRPr lang="en-GB" dirty="0"/>
+          </a:p>
+          <a:p>
+            <a:pPr algn="l"/>
+            <a:endParaRPr lang="en-GB" dirty="0"/>
+          </a:p>
+          <a:p>
+            <a:pPr algn="l"/>
+            <a:endParaRPr lang="en-GB" dirty="0"/>
+          </a:p>
+          <a:p>
+            <a:pPr algn="l"/>
+            <a:endParaRPr lang="en-GB" dirty="0"/>
+          </a:p>
+        </p:txBody>
+      </p:sp>
+      <p:sp>
+        <p:nvSpPr>
+          <p:cNvPr id="5" name="TextBox 4">
+            <a:extLst>
+              <a:ext uri="{FF2B5EF4-FFF2-40B4-BE49-F238E27FC236}">
+                <a16:creationId xmlns:a16="http://schemas.microsoft.com/office/drawing/2014/main" id="{0D76719E-E8B7-4A2F-98E5-B7A5D50E91AB}"/>
+              </a:ext>
+            </a:extLst>
+          </p:cNvPr>
+          <p:cNvSpPr txBox="1"/>
+          <p:nvPr/>
+        </p:nvSpPr>
+        <p:spPr>
+          <a:xfrm>
+            <a:off x="1566809" y="1345915"/>
+            <a:ext cx="8152544" cy="3077766"/>
+          </a:xfrm>
+          <a:prstGeom prst="rect">
+            <a:avLst/>
+          </a:prstGeom>
+          <a:noFill/>
+        </p:spPr>
+        <p:txBody>
+          <a:bodyPr wrap="square" rtlCol="0">
+            <a:spAutoFit/>
+          </a:bodyPr>
+          <a:lstStyle/>
+          <a:p>
+            <a:pPr marL="457200" indent="-457200">
+              <a:buFont typeface="+mj-lt"/>
+              <a:buAutoNum type="arabicPeriod"/>
+            </a:pPr>
+            <a:r>
+              <a:rPr lang="en-GB" sz="2000" dirty="0"/>
+              <a:t>Conclude PBI Streaming ( Fiddler &amp; </a:t>
+            </a:r>
+            <a:r>
+              <a:rPr lang="en-GB" sz="2000" dirty="0" err="1"/>
+              <a:t>PubNub</a:t>
+            </a:r>
+            <a:r>
+              <a:rPr lang="en-GB" sz="2000" dirty="0"/>
+              <a:t>)</a:t>
+            </a:r>
+          </a:p>
+          <a:p>
+            <a:pPr marL="457200" indent="-457200">
+              <a:buFont typeface="+mj-lt"/>
+              <a:buAutoNum type="arabicPeriod"/>
+            </a:pPr>
+            <a:r>
+              <a:rPr lang="en-GB" sz="2000" dirty="0"/>
+              <a:t>Review Homework with RANKX</a:t>
+            </a:r>
+          </a:p>
+          <a:p>
+            <a:pPr marL="457200" indent="-457200">
+              <a:buFont typeface="+mj-lt"/>
+              <a:buAutoNum type="arabicPeriod"/>
+            </a:pPr>
+            <a:r>
+              <a:rPr lang="en-GB" sz="2000" dirty="0"/>
+              <a:t>PBI AAD B2B</a:t>
+            </a:r>
+          </a:p>
+          <a:p>
+            <a:pPr marL="457200" indent="-457200">
+              <a:buFont typeface="+mj-lt"/>
+              <a:buAutoNum type="arabicPeriod"/>
+            </a:pPr>
+            <a:r>
+              <a:rPr lang="en-GB" sz="2000" dirty="0"/>
+              <a:t>Power BI Gateways</a:t>
+            </a:r>
+          </a:p>
+          <a:p>
+            <a:pPr marL="457200" indent="-457200">
+              <a:buFont typeface="+mj-lt"/>
+              <a:buAutoNum type="arabicPeriod"/>
+            </a:pPr>
+            <a:r>
+              <a:rPr lang="en-GB" sz="2000" dirty="0"/>
+              <a:t>Scheduled Refresh</a:t>
+            </a:r>
+          </a:p>
+          <a:p>
+            <a:pPr marL="457200" indent="-457200">
+              <a:buFont typeface="+mj-lt"/>
+              <a:buAutoNum type="arabicPeriod"/>
+            </a:pPr>
+            <a:r>
+              <a:rPr lang="en-GB" sz="2000" dirty="0"/>
+              <a:t>Row Level Security</a:t>
+            </a:r>
+          </a:p>
+          <a:p>
+            <a:pPr marL="457200" indent="-457200">
+              <a:buFont typeface="+mj-lt"/>
+              <a:buAutoNum type="arabicPeriod"/>
+            </a:pPr>
+            <a:r>
+              <a:rPr lang="en-GB" sz="2000" dirty="0"/>
+              <a:t>Demos</a:t>
+            </a:r>
+          </a:p>
+          <a:p>
+            <a:endParaRPr lang="en-GB" dirty="0"/>
+          </a:p>
+          <a:p>
+            <a:endParaRPr lang="en-GB" dirty="0"/>
+          </a:p>
+          <a:p>
+            <a:endParaRPr lang="en-GB" dirty="0"/>
+          </a:p>
+        </p:txBody>
+      </p:sp>
+    </p:spTree>
+    <p:extLst>
+      <p:ext uri="{BB962C8B-B14F-4D97-AF65-F5344CB8AC3E}">
+        <p14:creationId xmlns:p14="http://schemas.microsoft.com/office/powerpoint/2010/main" val="1200484331"/>
+      </p:ext>
+    </p:extLst>
+  </p:cSld>
+  <p:clrMapOvr>
+    <a:masterClrMapping/>
+  </p:clrMapOvr>
+</p:sld>
+</file>
+
+<file path=ppt/slides/slide22.xml><?xml version="1.0" encoding="utf-8"?>
+<p:sld xmlns:a="http://schemas.openxmlformats.org/drawingml/2006/main" xmlns:r="http://schemas.openxmlformats.org/officeDocument/2006/relationships" xmlns:p="http://schemas.openxmlformats.org/presentationml/2006/main">
+  <p:cSld>
+    <p:spTree>
+      <p:nvGrpSpPr>
+        <p:cNvPr id="1" name=""/>
+        <p:cNvGrpSpPr/>
+        <p:nvPr/>
+      </p:nvGrpSpPr>
+      <p:grpSpPr>
+        <a:xfrm>
+          <a:off x="0" y="0"/>
+          <a:ext cx="0" cy="0"/>
+          <a:chOff x="0" y="0"/>
+          <a:chExt cx="0" cy="0"/>
+        </a:xfrm>
+      </p:grpSpPr>
+      <p:sp>
+        <p:nvSpPr>
+          <p:cNvPr id="2" name="Title 1">
+            <a:extLst>
+              <a:ext uri="{FF2B5EF4-FFF2-40B4-BE49-F238E27FC236}">
+                <a16:creationId xmlns:a16="http://schemas.microsoft.com/office/drawing/2014/main" id="{4F5FFE88-7B14-4763-806D-A2BFC137C899}"/>
+              </a:ext>
+            </a:extLst>
+          </p:cNvPr>
+          <p:cNvSpPr>
+            <a:spLocks noGrp="1"/>
+          </p:cNvSpPr>
+          <p:nvPr>
+            <p:ph type="ctrTitle"/>
+          </p:nvPr>
+        </p:nvSpPr>
+        <p:spPr>
+          <a:xfrm>
+            <a:off x="1428750" y="252414"/>
+            <a:ext cx="9144000" cy="656850"/>
+          </a:xfrm>
+        </p:spPr>
+        <p:txBody>
+          <a:bodyPr>
+            <a:normAutofit fontScale="90000"/>
+          </a:bodyPr>
+          <a:lstStyle/>
+          <a:p>
+            <a:r>
+              <a:rPr lang="en-GB" dirty="0"/>
+              <a:t>Power BI Real time datasets: Streaming</a:t>
+            </a:r>
+          </a:p>
+        </p:txBody>
+      </p:sp>
+      <p:sp>
+        <p:nvSpPr>
+          <p:cNvPr id="3" name="Subtitle 2">
+            <a:extLst>
+              <a:ext uri="{FF2B5EF4-FFF2-40B4-BE49-F238E27FC236}">
+                <a16:creationId xmlns:a16="http://schemas.microsoft.com/office/drawing/2014/main" id="{EA597543-2A3A-4FD5-9DA6-D09EB6B64855}"/>
+              </a:ext>
+            </a:extLst>
+          </p:cNvPr>
+          <p:cNvSpPr>
+            <a:spLocks noGrp="1"/>
+          </p:cNvSpPr>
+          <p:nvPr>
+            <p:ph type="subTitle" idx="1"/>
+          </p:nvPr>
+        </p:nvSpPr>
+        <p:spPr>
+          <a:xfrm>
+            <a:off x="1524000" y="1063671"/>
+            <a:ext cx="9144000" cy="4435867"/>
+          </a:xfrm>
+        </p:spPr>
+        <p:txBody>
+          <a:bodyPr>
+            <a:normAutofit/>
+          </a:bodyPr>
+          <a:lstStyle/>
+          <a:p>
+            <a:pPr algn="l"/>
             <a:r>
               <a:rPr lang="en-GB" dirty="0"/>
               <a:t>See slides  15-27</a:t>
@@ -10074,6 +11492,1451 @@
     <p:extLst>
       <p:ext uri="{BB962C8B-B14F-4D97-AF65-F5344CB8AC3E}">
         <p14:creationId xmlns:p14="http://schemas.microsoft.com/office/powerpoint/2010/main" val="2041026376"/>
+      </p:ext>
+    </p:extLst>
+  </p:cSld>
+  <p:clrMapOvr>
+    <a:masterClrMapping/>
+  </p:clrMapOvr>
+</p:sld>
+</file>
+
+<file path=ppt/slides/slide23.xml><?xml version="1.0" encoding="utf-8"?>
+<p:sld xmlns:a="http://schemas.openxmlformats.org/drawingml/2006/main" xmlns:r="http://schemas.openxmlformats.org/officeDocument/2006/relationships" xmlns:p="http://schemas.openxmlformats.org/presentationml/2006/main">
+  <p:cSld>
+    <p:spTree>
+      <p:nvGrpSpPr>
+        <p:cNvPr id="1" name=""/>
+        <p:cNvGrpSpPr/>
+        <p:nvPr/>
+      </p:nvGrpSpPr>
+      <p:grpSpPr>
+        <a:xfrm>
+          <a:off x="0" y="0"/>
+          <a:ext cx="0" cy="0"/>
+          <a:chOff x="0" y="0"/>
+          <a:chExt cx="0" cy="0"/>
+        </a:xfrm>
+      </p:grpSpPr>
+      <p:sp>
+        <p:nvSpPr>
+          <p:cNvPr id="2" name="Title 1">
+            <a:extLst>
+              <a:ext uri="{FF2B5EF4-FFF2-40B4-BE49-F238E27FC236}">
+                <a16:creationId xmlns:a16="http://schemas.microsoft.com/office/drawing/2014/main" id="{4F5FFE88-7B14-4763-806D-A2BFC137C899}"/>
+              </a:ext>
+            </a:extLst>
+          </p:cNvPr>
+          <p:cNvSpPr>
+            <a:spLocks noGrp="1"/>
+          </p:cNvSpPr>
+          <p:nvPr>
+            <p:ph type="ctrTitle"/>
+          </p:nvPr>
+        </p:nvSpPr>
+        <p:spPr>
+          <a:xfrm>
+            <a:off x="1428750" y="252414"/>
+            <a:ext cx="9144000" cy="656850"/>
+          </a:xfrm>
+        </p:spPr>
+        <p:txBody>
+          <a:bodyPr>
+            <a:normAutofit fontScale="90000"/>
+          </a:bodyPr>
+          <a:lstStyle/>
+          <a:p>
+            <a:r>
+              <a:rPr lang="en-GB" dirty="0"/>
+              <a:t>Power BI Dax Homework</a:t>
+            </a:r>
+          </a:p>
+        </p:txBody>
+      </p:sp>
+      <p:sp>
+        <p:nvSpPr>
+          <p:cNvPr id="3" name="Subtitle 2">
+            <a:extLst>
+              <a:ext uri="{FF2B5EF4-FFF2-40B4-BE49-F238E27FC236}">
+                <a16:creationId xmlns:a16="http://schemas.microsoft.com/office/drawing/2014/main" id="{EA597543-2A3A-4FD5-9DA6-D09EB6B64855}"/>
+              </a:ext>
+            </a:extLst>
+          </p:cNvPr>
+          <p:cNvSpPr>
+            <a:spLocks noGrp="1"/>
+          </p:cNvSpPr>
+          <p:nvPr>
+            <p:ph type="subTitle" idx="1"/>
+          </p:nvPr>
+        </p:nvSpPr>
+        <p:spPr>
+          <a:xfrm>
+            <a:off x="1524000" y="1063671"/>
+            <a:ext cx="9144000" cy="4435867"/>
+          </a:xfrm>
+        </p:spPr>
+        <p:txBody>
+          <a:bodyPr>
+            <a:normAutofit fontScale="85000" lnSpcReduction="20000"/>
+          </a:bodyPr>
+          <a:lstStyle/>
+          <a:p>
+            <a:pPr algn="l"/>
+            <a:r>
+              <a:rPr lang="en-GB" dirty="0"/>
+              <a:t>Ultimate Beginners 18 lessons 2 hours : Enterprise DNA training</a:t>
+            </a:r>
+          </a:p>
+          <a:p>
+            <a:pPr algn="l"/>
+            <a:r>
+              <a:rPr lang="en-GB" dirty="0"/>
+              <a:t>1: Evaluation context (1.8)</a:t>
+            </a:r>
+          </a:p>
+          <a:p>
+            <a:pPr algn="l"/>
+            <a:r>
+              <a:rPr lang="en-GB" dirty="0"/>
+              <a:t>2: Filter or Row depending on DAX</a:t>
+            </a:r>
+          </a:p>
+          <a:p>
+            <a:pPr algn="l"/>
+            <a:r>
+              <a:rPr lang="en-GB" dirty="0"/>
+              <a:t>Filter context (1.9)</a:t>
+            </a:r>
+          </a:p>
+          <a:p>
+            <a:pPr algn="l"/>
+            <a:r>
+              <a:rPr lang="en-GB" dirty="0"/>
+              <a:t>Row context (watch 1.10)</a:t>
+            </a:r>
+          </a:p>
+          <a:p>
+            <a:pPr algn="l"/>
+            <a:r>
+              <a:rPr lang="en-GB" dirty="0"/>
+              <a:t>30 rolling days re Oliver question see 1.11</a:t>
+            </a:r>
+          </a:p>
+          <a:p>
+            <a:pPr algn="l"/>
+            <a:endParaRPr lang="en-GB" dirty="0"/>
+          </a:p>
+          <a:p>
+            <a:pPr algn="l"/>
+            <a:r>
+              <a:rPr lang="en-GB" dirty="0"/>
+              <a:t>Video 1.18 DAX RANKX did you get it ? Next slide</a:t>
+            </a:r>
+          </a:p>
+          <a:p>
+            <a:pPr algn="l"/>
+            <a:endParaRPr lang="en-GB" dirty="0"/>
+          </a:p>
+          <a:p>
+            <a:pPr algn="l"/>
+            <a:endParaRPr lang="en-GB" dirty="0"/>
+          </a:p>
+          <a:p>
+            <a:pPr algn="l"/>
+            <a:r>
+              <a:rPr lang="en-GB" dirty="0"/>
+              <a:t>Check this resource for DAX</a:t>
+            </a:r>
+          </a:p>
+          <a:p>
+            <a:pPr algn="l"/>
+            <a:r>
+              <a:rPr lang="en-GB" dirty="0"/>
+              <a:t>https://www.powerpivotpro.com/wp-content/uploads/2015/10/PowerPivotPro-Reference-Card.pdf</a:t>
+            </a:r>
+          </a:p>
+          <a:p>
+            <a:pPr algn="l"/>
+            <a:endParaRPr lang="en-GB" dirty="0"/>
+          </a:p>
+          <a:p>
+            <a:pPr algn="l"/>
+            <a:endParaRPr lang="en-GB" dirty="0"/>
+          </a:p>
+          <a:p>
+            <a:pPr algn="l"/>
+            <a:endParaRPr lang="en-GB" dirty="0"/>
+          </a:p>
+        </p:txBody>
+      </p:sp>
+    </p:spTree>
+    <p:extLst>
+      <p:ext uri="{BB962C8B-B14F-4D97-AF65-F5344CB8AC3E}">
+        <p14:creationId xmlns:p14="http://schemas.microsoft.com/office/powerpoint/2010/main" val="2760458424"/>
+      </p:ext>
+    </p:extLst>
+  </p:cSld>
+  <p:clrMapOvr>
+    <a:masterClrMapping/>
+  </p:clrMapOvr>
+</p:sld>
+</file>
+
+<file path=ppt/slides/slide24.xml><?xml version="1.0" encoding="utf-8"?>
+<p:sld xmlns:a="http://schemas.openxmlformats.org/drawingml/2006/main" xmlns:r="http://schemas.openxmlformats.org/officeDocument/2006/relationships" xmlns:p="http://schemas.openxmlformats.org/presentationml/2006/main">
+  <p:cSld>
+    <p:spTree>
+      <p:nvGrpSpPr>
+        <p:cNvPr id="1" name=""/>
+        <p:cNvGrpSpPr/>
+        <p:nvPr/>
+      </p:nvGrpSpPr>
+      <p:grpSpPr>
+        <a:xfrm>
+          <a:off x="0" y="0"/>
+          <a:ext cx="0" cy="0"/>
+          <a:chOff x="0" y="0"/>
+          <a:chExt cx="0" cy="0"/>
+        </a:xfrm>
+      </p:grpSpPr>
+      <p:sp>
+        <p:nvSpPr>
+          <p:cNvPr id="2" name="Title 1">
+            <a:extLst>
+              <a:ext uri="{FF2B5EF4-FFF2-40B4-BE49-F238E27FC236}">
+                <a16:creationId xmlns:a16="http://schemas.microsoft.com/office/drawing/2014/main" id="{4F5FFE88-7B14-4763-806D-A2BFC137C899}"/>
+              </a:ext>
+            </a:extLst>
+          </p:cNvPr>
+          <p:cNvSpPr>
+            <a:spLocks noGrp="1"/>
+          </p:cNvSpPr>
+          <p:nvPr>
+            <p:ph type="ctrTitle"/>
+          </p:nvPr>
+        </p:nvSpPr>
+        <p:spPr>
+          <a:xfrm>
+            <a:off x="1428750" y="252414"/>
+            <a:ext cx="9144000" cy="656850"/>
+          </a:xfrm>
+        </p:spPr>
+        <p:txBody>
+          <a:bodyPr>
+            <a:normAutofit fontScale="90000"/>
+          </a:bodyPr>
+          <a:lstStyle/>
+          <a:p>
+            <a:r>
+              <a:rPr lang="en-GB" dirty="0"/>
+              <a:t>Power BI DAX RANKX</a:t>
+            </a:r>
+          </a:p>
+        </p:txBody>
+      </p:sp>
+      <p:sp>
+        <p:nvSpPr>
+          <p:cNvPr id="3" name="Subtitle 2">
+            <a:extLst>
+              <a:ext uri="{FF2B5EF4-FFF2-40B4-BE49-F238E27FC236}">
+                <a16:creationId xmlns:a16="http://schemas.microsoft.com/office/drawing/2014/main" id="{EA597543-2A3A-4FD5-9DA6-D09EB6B64855}"/>
+              </a:ext>
+            </a:extLst>
+          </p:cNvPr>
+          <p:cNvSpPr>
+            <a:spLocks noGrp="1"/>
+          </p:cNvSpPr>
+          <p:nvPr>
+            <p:ph type="subTitle" idx="1"/>
+          </p:nvPr>
+        </p:nvSpPr>
+        <p:spPr>
+          <a:xfrm>
+            <a:off x="1559960" y="2635321"/>
+            <a:ext cx="9144000" cy="3506351"/>
+          </a:xfrm>
+        </p:spPr>
+        <p:txBody>
+          <a:bodyPr>
+            <a:normAutofit fontScale="92500" lnSpcReduction="20000"/>
+          </a:bodyPr>
+          <a:lstStyle/>
+          <a:p>
+            <a:pPr algn="l"/>
+            <a:r>
+              <a:rPr lang="en-GB" dirty="0"/>
+              <a:t>Customer Group Profits =</a:t>
+            </a:r>
+          </a:p>
+          <a:p>
+            <a:pPr algn="l"/>
+            <a:r>
+              <a:rPr lang="en-GB" dirty="0"/>
+              <a:t>CALCULATE( [Total Profits],</a:t>
+            </a:r>
+          </a:p>
+          <a:p>
+            <a:pPr algn="l"/>
+            <a:r>
+              <a:rPr lang="en-GB" dirty="0"/>
+              <a:t>FILTER( VALUES( Customers[Customer Name] ),</a:t>
+            </a:r>
+          </a:p>
+          <a:p>
+            <a:pPr algn="l"/>
+            <a:r>
+              <a:rPr lang="en-GB" dirty="0"/>
+              <a:t>COUNTROWS(</a:t>
+            </a:r>
+          </a:p>
+          <a:p>
+            <a:pPr algn="l"/>
+            <a:r>
+              <a:rPr lang="en-GB" dirty="0"/>
+              <a:t>	FILTER( 'Customer Groups’,</a:t>
+            </a:r>
+          </a:p>
+          <a:p>
+            <a:pPr algn="l"/>
+            <a:r>
+              <a:rPr lang="en-GB" dirty="0"/>
+              <a:t>	RANKX( ALL( Customers[Customer Name] ), [Total Profits],, DESC ) &gt; 'Customer Groups'[Min]</a:t>
+            </a:r>
+          </a:p>
+          <a:p>
+            <a:pPr algn="l"/>
+            <a:r>
+              <a:rPr lang="en-GB" dirty="0"/>
+              <a:t>	&amp;&amp; RANKX( ALL( Customers[Customer Name] ), [Total Profits],, DESC ) &lt;= 'Customer Groups'[Max] ) )</a:t>
+            </a:r>
+          </a:p>
+          <a:p>
+            <a:pPr algn="l"/>
+            <a:r>
+              <a:rPr lang="en-GB" dirty="0"/>
+              <a:t>&gt; 0 ) )</a:t>
+            </a:r>
+          </a:p>
+          <a:p>
+            <a:pPr algn="l"/>
+            <a:endParaRPr lang="en-GB" sz="1600" dirty="0"/>
+          </a:p>
+          <a:p>
+            <a:pPr algn="l"/>
+            <a:endParaRPr lang="en-GB" dirty="0"/>
+          </a:p>
+        </p:txBody>
+      </p:sp>
+      <p:sp>
+        <p:nvSpPr>
+          <p:cNvPr id="4" name="Subtitle 2">
+            <a:extLst>
+              <a:ext uri="{FF2B5EF4-FFF2-40B4-BE49-F238E27FC236}">
+                <a16:creationId xmlns:a16="http://schemas.microsoft.com/office/drawing/2014/main" id="{0EF62DD6-25EE-491D-8957-EB6046F9F8D1}"/>
+              </a:ext>
+            </a:extLst>
+          </p:cNvPr>
+          <p:cNvSpPr txBox="1">
+            <a:spLocks/>
+          </p:cNvSpPr>
+          <p:nvPr/>
+        </p:nvSpPr>
+        <p:spPr>
+          <a:xfrm>
+            <a:off x="1524000" y="909264"/>
+            <a:ext cx="9972782" cy="1141847"/>
+          </a:xfrm>
+          <a:prstGeom prst="rect">
+            <a:avLst/>
+          </a:prstGeom>
+        </p:spPr>
+        <p:txBody>
+          <a:bodyPr vert="horz" lIns="91440" tIns="45720" rIns="91440" bIns="45720" rtlCol="0">
+            <a:normAutofit/>
+          </a:bodyPr>
+          <a:lstStyle>
+            <a:lvl1pPr marL="0" indent="0" algn="ctr" defTabSz="914400" rtl="0" eaLnBrk="1" latinLnBrk="0" hangingPunct="1">
+              <a:lnSpc>
+                <a:spcPct val="90000"/>
+              </a:lnSpc>
+              <a:spcBef>
+                <a:spcPts val="1000"/>
+              </a:spcBef>
+              <a:buFont typeface="Arial" panose="020B0604020202020204" pitchFamily="34" charset="0"/>
+              <a:buNone/>
+              <a:defRPr sz="2400" kern="1200">
+                <a:solidFill>
+                  <a:schemeClr val="tx1"/>
+                </a:solidFill>
+                <a:latin typeface="+mn-lt"/>
+                <a:ea typeface="+mn-ea"/>
+                <a:cs typeface="+mn-cs"/>
+              </a:defRPr>
+            </a:lvl1pPr>
+            <a:lvl2pPr marL="457200" indent="0" algn="ctr" defTabSz="914400" rtl="0" eaLnBrk="1" latinLnBrk="0" hangingPunct="1">
+              <a:lnSpc>
+                <a:spcPct val="90000"/>
+              </a:lnSpc>
+              <a:spcBef>
+                <a:spcPts val="500"/>
+              </a:spcBef>
+              <a:buFont typeface="Arial" panose="020B0604020202020204" pitchFamily="34" charset="0"/>
+              <a:buNone/>
+              <a:defRPr sz="2000" kern="1200">
+                <a:solidFill>
+                  <a:schemeClr val="tx1"/>
+                </a:solidFill>
+                <a:latin typeface="+mn-lt"/>
+                <a:ea typeface="+mn-ea"/>
+                <a:cs typeface="+mn-cs"/>
+              </a:defRPr>
+            </a:lvl2pPr>
+            <a:lvl3pPr marL="914400" indent="0" algn="ctr" defTabSz="914400" rtl="0" eaLnBrk="1" latinLnBrk="0" hangingPunct="1">
+              <a:lnSpc>
+                <a:spcPct val="90000"/>
+              </a:lnSpc>
+              <a:spcBef>
+                <a:spcPts val="500"/>
+              </a:spcBef>
+              <a:buFont typeface="Arial" panose="020B0604020202020204" pitchFamily="34" charset="0"/>
+              <a:buNone/>
+              <a:defRPr sz="1800" kern="1200">
+                <a:solidFill>
+                  <a:schemeClr val="tx1"/>
+                </a:solidFill>
+                <a:latin typeface="+mn-lt"/>
+                <a:ea typeface="+mn-ea"/>
+                <a:cs typeface="+mn-cs"/>
+              </a:defRPr>
+            </a:lvl3pPr>
+            <a:lvl4pPr marL="1371600" indent="0" algn="ctr" defTabSz="914400" rtl="0" eaLnBrk="1" latinLnBrk="0" hangingPunct="1">
+              <a:lnSpc>
+                <a:spcPct val="90000"/>
+              </a:lnSpc>
+              <a:spcBef>
+                <a:spcPts val="500"/>
+              </a:spcBef>
+              <a:buFont typeface="Arial" panose="020B0604020202020204" pitchFamily="34" charset="0"/>
+              <a:buNone/>
+              <a:defRPr sz="1600" kern="1200">
+                <a:solidFill>
+                  <a:schemeClr val="tx1"/>
+                </a:solidFill>
+                <a:latin typeface="+mn-lt"/>
+                <a:ea typeface="+mn-ea"/>
+                <a:cs typeface="+mn-cs"/>
+              </a:defRPr>
+            </a:lvl4pPr>
+            <a:lvl5pPr marL="1828800" indent="0" algn="ctr" defTabSz="914400" rtl="0" eaLnBrk="1" latinLnBrk="0" hangingPunct="1">
+              <a:lnSpc>
+                <a:spcPct val="90000"/>
+              </a:lnSpc>
+              <a:spcBef>
+                <a:spcPts val="500"/>
+              </a:spcBef>
+              <a:buFont typeface="Arial" panose="020B0604020202020204" pitchFamily="34" charset="0"/>
+              <a:buNone/>
+              <a:defRPr sz="1600" kern="1200">
+                <a:solidFill>
+                  <a:schemeClr val="tx1"/>
+                </a:solidFill>
+                <a:latin typeface="+mn-lt"/>
+                <a:ea typeface="+mn-ea"/>
+                <a:cs typeface="+mn-cs"/>
+              </a:defRPr>
+            </a:lvl5pPr>
+            <a:lvl6pPr marL="2286000" indent="0" algn="ctr" defTabSz="914400" rtl="0" eaLnBrk="1" latinLnBrk="0" hangingPunct="1">
+              <a:lnSpc>
+                <a:spcPct val="90000"/>
+              </a:lnSpc>
+              <a:spcBef>
+                <a:spcPts val="500"/>
+              </a:spcBef>
+              <a:buFont typeface="Arial" panose="020B0604020202020204" pitchFamily="34" charset="0"/>
+              <a:buNone/>
+              <a:defRPr sz="1600" kern="1200">
+                <a:solidFill>
+                  <a:schemeClr val="tx1"/>
+                </a:solidFill>
+                <a:latin typeface="+mn-lt"/>
+                <a:ea typeface="+mn-ea"/>
+                <a:cs typeface="+mn-cs"/>
+              </a:defRPr>
+            </a:lvl6pPr>
+            <a:lvl7pPr marL="2743200" indent="0" algn="ctr" defTabSz="914400" rtl="0" eaLnBrk="1" latinLnBrk="0" hangingPunct="1">
+              <a:lnSpc>
+                <a:spcPct val="90000"/>
+              </a:lnSpc>
+              <a:spcBef>
+                <a:spcPts val="500"/>
+              </a:spcBef>
+              <a:buFont typeface="Arial" panose="020B0604020202020204" pitchFamily="34" charset="0"/>
+              <a:buNone/>
+              <a:defRPr sz="1600" kern="1200">
+                <a:solidFill>
+                  <a:schemeClr val="tx1"/>
+                </a:solidFill>
+                <a:latin typeface="+mn-lt"/>
+                <a:ea typeface="+mn-ea"/>
+                <a:cs typeface="+mn-cs"/>
+              </a:defRPr>
+            </a:lvl7pPr>
+            <a:lvl8pPr marL="3200400" indent="0" algn="ctr" defTabSz="914400" rtl="0" eaLnBrk="1" latinLnBrk="0" hangingPunct="1">
+              <a:lnSpc>
+                <a:spcPct val="90000"/>
+              </a:lnSpc>
+              <a:spcBef>
+                <a:spcPts val="500"/>
+              </a:spcBef>
+              <a:buFont typeface="Arial" panose="020B0604020202020204" pitchFamily="34" charset="0"/>
+              <a:buNone/>
+              <a:defRPr sz="1600" kern="1200">
+                <a:solidFill>
+                  <a:schemeClr val="tx1"/>
+                </a:solidFill>
+                <a:latin typeface="+mn-lt"/>
+                <a:ea typeface="+mn-ea"/>
+                <a:cs typeface="+mn-cs"/>
+              </a:defRPr>
+            </a:lvl8pPr>
+            <a:lvl9pPr marL="3657600" indent="0" algn="ctr" defTabSz="914400" rtl="0" eaLnBrk="1" latinLnBrk="0" hangingPunct="1">
+              <a:lnSpc>
+                <a:spcPct val="90000"/>
+              </a:lnSpc>
+              <a:spcBef>
+                <a:spcPts val="500"/>
+              </a:spcBef>
+              <a:buFont typeface="Arial" panose="020B0604020202020204" pitchFamily="34" charset="0"/>
+              <a:buNone/>
+              <a:defRPr sz="1600" kern="1200">
+                <a:solidFill>
+                  <a:schemeClr val="tx1"/>
+                </a:solidFill>
+                <a:latin typeface="+mn-lt"/>
+                <a:ea typeface="+mn-ea"/>
+                <a:cs typeface="+mn-cs"/>
+              </a:defRPr>
+            </a:lvl9pPr>
+          </a:lstStyle>
+          <a:p>
+            <a:pPr algn="l"/>
+            <a:r>
+              <a:rPr lang="en-GB" dirty="0"/>
+              <a:t>Dynamic Top 10 dynamically by product.</a:t>
+            </a:r>
+          </a:p>
+          <a:p>
+            <a:pPr algn="l"/>
+            <a:r>
+              <a:rPr lang="en-GB" dirty="0"/>
+              <a:t>Learn RANKX https://www.youtube.com/watch?v=HJdVfYkfhmE</a:t>
+            </a:r>
+          </a:p>
+          <a:p>
+            <a:pPr algn="l"/>
+            <a:endParaRPr lang="en-GB" dirty="0"/>
+          </a:p>
+        </p:txBody>
+      </p:sp>
+    </p:spTree>
+    <p:extLst>
+      <p:ext uri="{BB962C8B-B14F-4D97-AF65-F5344CB8AC3E}">
+        <p14:creationId xmlns:p14="http://schemas.microsoft.com/office/powerpoint/2010/main" val="813403440"/>
+      </p:ext>
+    </p:extLst>
+  </p:cSld>
+  <p:clrMapOvr>
+    <a:masterClrMapping/>
+  </p:clrMapOvr>
+</p:sld>
+</file>
+
+<file path=ppt/slides/slide25.xml><?xml version="1.0" encoding="utf-8"?>
+<p:sld xmlns:a="http://schemas.openxmlformats.org/drawingml/2006/main" xmlns:r="http://schemas.openxmlformats.org/officeDocument/2006/relationships" xmlns:p="http://schemas.openxmlformats.org/presentationml/2006/main">
+  <p:cSld>
+    <p:spTree>
+      <p:nvGrpSpPr>
+        <p:cNvPr id="1" name=""/>
+        <p:cNvGrpSpPr/>
+        <p:nvPr/>
+      </p:nvGrpSpPr>
+      <p:grpSpPr>
+        <a:xfrm>
+          <a:off x="0" y="0"/>
+          <a:ext cx="0" cy="0"/>
+          <a:chOff x="0" y="0"/>
+          <a:chExt cx="0" cy="0"/>
+        </a:xfrm>
+      </p:grpSpPr>
+      <p:sp>
+        <p:nvSpPr>
+          <p:cNvPr id="2" name="Title 1">
+            <a:extLst>
+              <a:ext uri="{FF2B5EF4-FFF2-40B4-BE49-F238E27FC236}">
+                <a16:creationId xmlns:a16="http://schemas.microsoft.com/office/drawing/2014/main" id="{4F5FFE88-7B14-4763-806D-A2BFC137C899}"/>
+              </a:ext>
+            </a:extLst>
+          </p:cNvPr>
+          <p:cNvSpPr>
+            <a:spLocks noGrp="1"/>
+          </p:cNvSpPr>
+          <p:nvPr>
+            <p:ph type="ctrTitle"/>
+          </p:nvPr>
+        </p:nvSpPr>
+        <p:spPr>
+          <a:xfrm>
+            <a:off x="1428750" y="252414"/>
+            <a:ext cx="9144000" cy="656850"/>
+          </a:xfrm>
+        </p:spPr>
+        <p:txBody>
+          <a:bodyPr>
+            <a:normAutofit fontScale="90000"/>
+          </a:bodyPr>
+          <a:lstStyle/>
+          <a:p>
+            <a:r>
+              <a:rPr lang="en-GB" dirty="0"/>
+              <a:t>Power BI AAD B2B</a:t>
+            </a:r>
+          </a:p>
+        </p:txBody>
+      </p:sp>
+      <p:sp>
+        <p:nvSpPr>
+          <p:cNvPr id="3" name="Subtitle 2">
+            <a:extLst>
+              <a:ext uri="{FF2B5EF4-FFF2-40B4-BE49-F238E27FC236}">
+                <a16:creationId xmlns:a16="http://schemas.microsoft.com/office/drawing/2014/main" id="{EA597543-2A3A-4FD5-9DA6-D09EB6B64855}"/>
+              </a:ext>
+            </a:extLst>
+          </p:cNvPr>
+          <p:cNvSpPr>
+            <a:spLocks noGrp="1"/>
+          </p:cNvSpPr>
+          <p:nvPr>
+            <p:ph type="subTitle" idx="1"/>
+          </p:nvPr>
+        </p:nvSpPr>
+        <p:spPr>
+          <a:xfrm>
+            <a:off x="1524000" y="1063671"/>
+            <a:ext cx="9144000" cy="4435867"/>
+          </a:xfrm>
+        </p:spPr>
+        <p:txBody>
+          <a:bodyPr>
+            <a:normAutofit/>
+          </a:bodyPr>
+          <a:lstStyle/>
+          <a:p>
+            <a:pPr algn="l"/>
+            <a:endParaRPr lang="en-GB" dirty="0"/>
+          </a:p>
+          <a:p>
+            <a:pPr algn="l"/>
+            <a:endParaRPr lang="en-GB" dirty="0"/>
+          </a:p>
+          <a:p>
+            <a:pPr algn="l"/>
+            <a:endParaRPr lang="en-GB" dirty="0"/>
+          </a:p>
+        </p:txBody>
+      </p:sp>
+      <p:sp>
+        <p:nvSpPr>
+          <p:cNvPr id="4" name="Subtitle 2">
+            <a:extLst>
+              <a:ext uri="{FF2B5EF4-FFF2-40B4-BE49-F238E27FC236}">
+                <a16:creationId xmlns:a16="http://schemas.microsoft.com/office/drawing/2014/main" id="{0EF62DD6-25EE-491D-8957-EB6046F9F8D1}"/>
+              </a:ext>
+            </a:extLst>
+          </p:cNvPr>
+          <p:cNvSpPr txBox="1">
+            <a:spLocks/>
+          </p:cNvSpPr>
+          <p:nvPr/>
+        </p:nvSpPr>
+        <p:spPr>
+          <a:xfrm>
+            <a:off x="1676400" y="1216071"/>
+            <a:ext cx="9144000" cy="4435867"/>
+          </a:xfrm>
+          <a:prstGeom prst="rect">
+            <a:avLst/>
+          </a:prstGeom>
+        </p:spPr>
+        <p:txBody>
+          <a:bodyPr vert="horz" lIns="91440" tIns="45720" rIns="91440" bIns="45720" rtlCol="0">
+            <a:normAutofit/>
+          </a:bodyPr>
+          <a:lstStyle>
+            <a:lvl1pPr marL="0" indent="0" algn="ctr" defTabSz="914400" rtl="0" eaLnBrk="1" latinLnBrk="0" hangingPunct="1">
+              <a:lnSpc>
+                <a:spcPct val="90000"/>
+              </a:lnSpc>
+              <a:spcBef>
+                <a:spcPts val="1000"/>
+              </a:spcBef>
+              <a:buFont typeface="Arial" panose="020B0604020202020204" pitchFamily="34" charset="0"/>
+              <a:buNone/>
+              <a:defRPr sz="2400" kern="1200">
+                <a:solidFill>
+                  <a:schemeClr val="tx1"/>
+                </a:solidFill>
+                <a:latin typeface="+mn-lt"/>
+                <a:ea typeface="+mn-ea"/>
+                <a:cs typeface="+mn-cs"/>
+              </a:defRPr>
+            </a:lvl1pPr>
+            <a:lvl2pPr marL="457200" indent="0" algn="ctr" defTabSz="914400" rtl="0" eaLnBrk="1" latinLnBrk="0" hangingPunct="1">
+              <a:lnSpc>
+                <a:spcPct val="90000"/>
+              </a:lnSpc>
+              <a:spcBef>
+                <a:spcPts val="500"/>
+              </a:spcBef>
+              <a:buFont typeface="Arial" panose="020B0604020202020204" pitchFamily="34" charset="0"/>
+              <a:buNone/>
+              <a:defRPr sz="2000" kern="1200">
+                <a:solidFill>
+                  <a:schemeClr val="tx1"/>
+                </a:solidFill>
+                <a:latin typeface="+mn-lt"/>
+                <a:ea typeface="+mn-ea"/>
+                <a:cs typeface="+mn-cs"/>
+              </a:defRPr>
+            </a:lvl2pPr>
+            <a:lvl3pPr marL="914400" indent="0" algn="ctr" defTabSz="914400" rtl="0" eaLnBrk="1" latinLnBrk="0" hangingPunct="1">
+              <a:lnSpc>
+                <a:spcPct val="90000"/>
+              </a:lnSpc>
+              <a:spcBef>
+                <a:spcPts val="500"/>
+              </a:spcBef>
+              <a:buFont typeface="Arial" panose="020B0604020202020204" pitchFamily="34" charset="0"/>
+              <a:buNone/>
+              <a:defRPr sz="1800" kern="1200">
+                <a:solidFill>
+                  <a:schemeClr val="tx1"/>
+                </a:solidFill>
+                <a:latin typeface="+mn-lt"/>
+                <a:ea typeface="+mn-ea"/>
+                <a:cs typeface="+mn-cs"/>
+              </a:defRPr>
+            </a:lvl3pPr>
+            <a:lvl4pPr marL="1371600" indent="0" algn="ctr" defTabSz="914400" rtl="0" eaLnBrk="1" latinLnBrk="0" hangingPunct="1">
+              <a:lnSpc>
+                <a:spcPct val="90000"/>
+              </a:lnSpc>
+              <a:spcBef>
+                <a:spcPts val="500"/>
+              </a:spcBef>
+              <a:buFont typeface="Arial" panose="020B0604020202020204" pitchFamily="34" charset="0"/>
+              <a:buNone/>
+              <a:defRPr sz="1600" kern="1200">
+                <a:solidFill>
+                  <a:schemeClr val="tx1"/>
+                </a:solidFill>
+                <a:latin typeface="+mn-lt"/>
+                <a:ea typeface="+mn-ea"/>
+                <a:cs typeface="+mn-cs"/>
+              </a:defRPr>
+            </a:lvl4pPr>
+            <a:lvl5pPr marL="1828800" indent="0" algn="ctr" defTabSz="914400" rtl="0" eaLnBrk="1" latinLnBrk="0" hangingPunct="1">
+              <a:lnSpc>
+                <a:spcPct val="90000"/>
+              </a:lnSpc>
+              <a:spcBef>
+                <a:spcPts val="500"/>
+              </a:spcBef>
+              <a:buFont typeface="Arial" panose="020B0604020202020204" pitchFamily="34" charset="0"/>
+              <a:buNone/>
+              <a:defRPr sz="1600" kern="1200">
+                <a:solidFill>
+                  <a:schemeClr val="tx1"/>
+                </a:solidFill>
+                <a:latin typeface="+mn-lt"/>
+                <a:ea typeface="+mn-ea"/>
+                <a:cs typeface="+mn-cs"/>
+              </a:defRPr>
+            </a:lvl5pPr>
+            <a:lvl6pPr marL="2286000" indent="0" algn="ctr" defTabSz="914400" rtl="0" eaLnBrk="1" latinLnBrk="0" hangingPunct="1">
+              <a:lnSpc>
+                <a:spcPct val="90000"/>
+              </a:lnSpc>
+              <a:spcBef>
+                <a:spcPts val="500"/>
+              </a:spcBef>
+              <a:buFont typeface="Arial" panose="020B0604020202020204" pitchFamily="34" charset="0"/>
+              <a:buNone/>
+              <a:defRPr sz="1600" kern="1200">
+                <a:solidFill>
+                  <a:schemeClr val="tx1"/>
+                </a:solidFill>
+                <a:latin typeface="+mn-lt"/>
+                <a:ea typeface="+mn-ea"/>
+                <a:cs typeface="+mn-cs"/>
+              </a:defRPr>
+            </a:lvl6pPr>
+            <a:lvl7pPr marL="2743200" indent="0" algn="ctr" defTabSz="914400" rtl="0" eaLnBrk="1" latinLnBrk="0" hangingPunct="1">
+              <a:lnSpc>
+                <a:spcPct val="90000"/>
+              </a:lnSpc>
+              <a:spcBef>
+                <a:spcPts val="500"/>
+              </a:spcBef>
+              <a:buFont typeface="Arial" panose="020B0604020202020204" pitchFamily="34" charset="0"/>
+              <a:buNone/>
+              <a:defRPr sz="1600" kern="1200">
+                <a:solidFill>
+                  <a:schemeClr val="tx1"/>
+                </a:solidFill>
+                <a:latin typeface="+mn-lt"/>
+                <a:ea typeface="+mn-ea"/>
+                <a:cs typeface="+mn-cs"/>
+              </a:defRPr>
+            </a:lvl7pPr>
+            <a:lvl8pPr marL="3200400" indent="0" algn="ctr" defTabSz="914400" rtl="0" eaLnBrk="1" latinLnBrk="0" hangingPunct="1">
+              <a:lnSpc>
+                <a:spcPct val="90000"/>
+              </a:lnSpc>
+              <a:spcBef>
+                <a:spcPts val="500"/>
+              </a:spcBef>
+              <a:buFont typeface="Arial" panose="020B0604020202020204" pitchFamily="34" charset="0"/>
+              <a:buNone/>
+              <a:defRPr sz="1600" kern="1200">
+                <a:solidFill>
+                  <a:schemeClr val="tx1"/>
+                </a:solidFill>
+                <a:latin typeface="+mn-lt"/>
+                <a:ea typeface="+mn-ea"/>
+                <a:cs typeface="+mn-cs"/>
+              </a:defRPr>
+            </a:lvl8pPr>
+            <a:lvl9pPr marL="3657600" indent="0" algn="ctr" defTabSz="914400" rtl="0" eaLnBrk="1" latinLnBrk="0" hangingPunct="1">
+              <a:lnSpc>
+                <a:spcPct val="90000"/>
+              </a:lnSpc>
+              <a:spcBef>
+                <a:spcPts val="500"/>
+              </a:spcBef>
+              <a:buFont typeface="Arial" panose="020B0604020202020204" pitchFamily="34" charset="0"/>
+              <a:buNone/>
+              <a:defRPr sz="1600" kern="1200">
+                <a:solidFill>
+                  <a:schemeClr val="tx1"/>
+                </a:solidFill>
+                <a:latin typeface="+mn-lt"/>
+                <a:ea typeface="+mn-ea"/>
+                <a:cs typeface="+mn-cs"/>
+              </a:defRPr>
+            </a:lvl9pPr>
+          </a:lstStyle>
+          <a:p>
+            <a:pPr algn="l"/>
+            <a:r>
+              <a:rPr lang="en-GB" dirty="0"/>
+              <a:t>Use slides from training 13.3</a:t>
+            </a:r>
+          </a:p>
+          <a:p>
+            <a:pPr algn="l"/>
+            <a:endParaRPr lang="en-GB" dirty="0"/>
+          </a:p>
+          <a:p>
+            <a:pPr algn="l"/>
+            <a:endParaRPr lang="en-GB" dirty="0"/>
+          </a:p>
+          <a:p>
+            <a:pPr algn="l"/>
+            <a:endParaRPr lang="en-GB" dirty="0"/>
+          </a:p>
+          <a:p>
+            <a:pPr algn="l"/>
+            <a:endParaRPr lang="en-GB" dirty="0"/>
+          </a:p>
+          <a:p>
+            <a:pPr algn="l"/>
+            <a:endParaRPr lang="en-GB" dirty="0"/>
+          </a:p>
+          <a:p>
+            <a:pPr algn="l"/>
+            <a:endParaRPr lang="en-GB" dirty="0"/>
+          </a:p>
+        </p:txBody>
+      </p:sp>
+    </p:spTree>
+    <p:extLst>
+      <p:ext uri="{BB962C8B-B14F-4D97-AF65-F5344CB8AC3E}">
+        <p14:creationId xmlns:p14="http://schemas.microsoft.com/office/powerpoint/2010/main" val="943049348"/>
+      </p:ext>
+    </p:extLst>
+  </p:cSld>
+  <p:clrMapOvr>
+    <a:masterClrMapping/>
+  </p:clrMapOvr>
+</p:sld>
+</file>
+
+<file path=ppt/slides/slide26.xml><?xml version="1.0" encoding="utf-8"?>
+<p:sld xmlns:a="http://schemas.openxmlformats.org/drawingml/2006/main" xmlns:r="http://schemas.openxmlformats.org/officeDocument/2006/relationships" xmlns:p="http://schemas.openxmlformats.org/presentationml/2006/main">
+  <p:cSld>
+    <p:spTree>
+      <p:nvGrpSpPr>
+        <p:cNvPr id="1" name=""/>
+        <p:cNvGrpSpPr/>
+        <p:nvPr/>
+      </p:nvGrpSpPr>
+      <p:grpSpPr>
+        <a:xfrm>
+          <a:off x="0" y="0"/>
+          <a:ext cx="0" cy="0"/>
+          <a:chOff x="0" y="0"/>
+          <a:chExt cx="0" cy="0"/>
+        </a:xfrm>
+      </p:grpSpPr>
+      <p:sp>
+        <p:nvSpPr>
+          <p:cNvPr id="2" name="Title 1">
+            <a:extLst>
+              <a:ext uri="{FF2B5EF4-FFF2-40B4-BE49-F238E27FC236}">
+                <a16:creationId xmlns:a16="http://schemas.microsoft.com/office/drawing/2014/main" id="{4F5FFE88-7B14-4763-806D-A2BFC137C899}"/>
+              </a:ext>
+            </a:extLst>
+          </p:cNvPr>
+          <p:cNvSpPr>
+            <a:spLocks noGrp="1"/>
+          </p:cNvSpPr>
+          <p:nvPr>
+            <p:ph type="ctrTitle"/>
+          </p:nvPr>
+        </p:nvSpPr>
+        <p:spPr>
+          <a:xfrm>
+            <a:off x="1428750" y="252414"/>
+            <a:ext cx="9144000" cy="656850"/>
+          </a:xfrm>
+        </p:spPr>
+        <p:txBody>
+          <a:bodyPr>
+            <a:normAutofit fontScale="90000"/>
+          </a:bodyPr>
+          <a:lstStyle/>
+          <a:p>
+            <a:r>
+              <a:rPr lang="en-GB" dirty="0"/>
+              <a:t>Power BI Gateways</a:t>
+            </a:r>
+          </a:p>
+        </p:txBody>
+      </p:sp>
+      <p:sp>
+        <p:nvSpPr>
+          <p:cNvPr id="3" name="Subtitle 2">
+            <a:extLst>
+              <a:ext uri="{FF2B5EF4-FFF2-40B4-BE49-F238E27FC236}">
+                <a16:creationId xmlns:a16="http://schemas.microsoft.com/office/drawing/2014/main" id="{EA597543-2A3A-4FD5-9DA6-D09EB6B64855}"/>
+              </a:ext>
+            </a:extLst>
+          </p:cNvPr>
+          <p:cNvSpPr>
+            <a:spLocks noGrp="1"/>
+          </p:cNvSpPr>
+          <p:nvPr>
+            <p:ph type="subTitle" idx="1"/>
+          </p:nvPr>
+        </p:nvSpPr>
+        <p:spPr>
+          <a:xfrm>
+            <a:off x="1524000" y="1063671"/>
+            <a:ext cx="9144000" cy="4435867"/>
+          </a:xfrm>
+        </p:spPr>
+        <p:txBody>
+          <a:bodyPr>
+            <a:normAutofit/>
+          </a:bodyPr>
+          <a:lstStyle/>
+          <a:p>
+            <a:pPr algn="l"/>
+            <a:endParaRPr lang="en-GB" dirty="0"/>
+          </a:p>
+          <a:p>
+            <a:pPr algn="l"/>
+            <a:endParaRPr lang="en-GB" dirty="0"/>
+          </a:p>
+          <a:p>
+            <a:pPr algn="l"/>
+            <a:endParaRPr lang="en-GB" dirty="0"/>
+          </a:p>
+        </p:txBody>
+      </p:sp>
+      <p:pic>
+        <p:nvPicPr>
+          <p:cNvPr id="5" name="Picture 4">
+            <a:extLst>
+              <a:ext uri="{FF2B5EF4-FFF2-40B4-BE49-F238E27FC236}">
+                <a16:creationId xmlns:a16="http://schemas.microsoft.com/office/drawing/2014/main" id="{9C214D5F-8442-4E39-A57C-F7DFCFE59C70}"/>
+              </a:ext>
+            </a:extLst>
+          </p:cNvPr>
+          <p:cNvPicPr>
+            <a:picLocks noChangeAspect="1"/>
+          </p:cNvPicPr>
+          <p:nvPr/>
+        </p:nvPicPr>
+        <p:blipFill>
+          <a:blip r:embed="rId3">
+            <a:extLst>
+              <a:ext uri="{28A0092B-C50C-407E-A947-70E740481C1C}">
+                <a14:useLocalDpi xmlns:a14="http://schemas.microsoft.com/office/drawing/2010/main" val="0"/>
+              </a:ext>
+            </a:extLst>
+          </a:blip>
+          <a:stretch>
+            <a:fillRect/>
+          </a:stretch>
+        </p:blipFill>
+        <p:spPr>
+          <a:xfrm>
+            <a:off x="1428750" y="987602"/>
+            <a:ext cx="9654283" cy="5387511"/>
+          </a:xfrm>
+          <a:prstGeom prst="rect">
+            <a:avLst/>
+          </a:prstGeom>
+        </p:spPr>
+      </p:pic>
+    </p:spTree>
+    <p:extLst>
+      <p:ext uri="{BB962C8B-B14F-4D97-AF65-F5344CB8AC3E}">
+        <p14:creationId xmlns:p14="http://schemas.microsoft.com/office/powerpoint/2010/main" val="3817898385"/>
+      </p:ext>
+    </p:extLst>
+  </p:cSld>
+  <p:clrMapOvr>
+    <a:masterClrMapping/>
+  </p:clrMapOvr>
+</p:sld>
+</file>
+
+<file path=ppt/slides/slide27.xml><?xml version="1.0" encoding="utf-8"?>
+<p:sld xmlns:a="http://schemas.openxmlformats.org/drawingml/2006/main" xmlns:r="http://schemas.openxmlformats.org/officeDocument/2006/relationships" xmlns:p="http://schemas.openxmlformats.org/presentationml/2006/main">
+  <p:cSld>
+    <p:spTree>
+      <p:nvGrpSpPr>
+        <p:cNvPr id="1" name=""/>
+        <p:cNvGrpSpPr/>
+        <p:nvPr/>
+      </p:nvGrpSpPr>
+      <p:grpSpPr>
+        <a:xfrm>
+          <a:off x="0" y="0"/>
+          <a:ext cx="0" cy="0"/>
+          <a:chOff x="0" y="0"/>
+          <a:chExt cx="0" cy="0"/>
+        </a:xfrm>
+      </p:grpSpPr>
+      <p:sp>
+        <p:nvSpPr>
+          <p:cNvPr id="2" name="Title 1">
+            <a:extLst>
+              <a:ext uri="{FF2B5EF4-FFF2-40B4-BE49-F238E27FC236}">
+                <a16:creationId xmlns:a16="http://schemas.microsoft.com/office/drawing/2014/main" id="{4F5FFE88-7B14-4763-806D-A2BFC137C899}"/>
+              </a:ext>
+            </a:extLst>
+          </p:cNvPr>
+          <p:cNvSpPr>
+            <a:spLocks noGrp="1"/>
+          </p:cNvSpPr>
+          <p:nvPr>
+            <p:ph type="ctrTitle"/>
+          </p:nvPr>
+        </p:nvSpPr>
+        <p:spPr>
+          <a:xfrm>
+            <a:off x="1428750" y="252414"/>
+            <a:ext cx="9144000" cy="656850"/>
+          </a:xfrm>
+        </p:spPr>
+        <p:txBody>
+          <a:bodyPr>
+            <a:normAutofit fontScale="90000"/>
+          </a:bodyPr>
+          <a:lstStyle/>
+          <a:p>
+            <a:r>
+              <a:rPr lang="en-GB" dirty="0"/>
+              <a:t>Power BI Row Level Security</a:t>
+            </a:r>
+          </a:p>
+        </p:txBody>
+      </p:sp>
+      <p:sp>
+        <p:nvSpPr>
+          <p:cNvPr id="3" name="Subtitle 2">
+            <a:extLst>
+              <a:ext uri="{FF2B5EF4-FFF2-40B4-BE49-F238E27FC236}">
+                <a16:creationId xmlns:a16="http://schemas.microsoft.com/office/drawing/2014/main" id="{EA597543-2A3A-4FD5-9DA6-D09EB6B64855}"/>
+              </a:ext>
+            </a:extLst>
+          </p:cNvPr>
+          <p:cNvSpPr>
+            <a:spLocks noGrp="1"/>
+          </p:cNvSpPr>
+          <p:nvPr>
+            <p:ph type="subTitle" idx="1"/>
+          </p:nvPr>
+        </p:nvSpPr>
+        <p:spPr>
+          <a:xfrm>
+            <a:off x="1524000" y="1063671"/>
+            <a:ext cx="9144000" cy="4435867"/>
+          </a:xfrm>
+        </p:spPr>
+        <p:txBody>
+          <a:bodyPr>
+            <a:normAutofit/>
+          </a:bodyPr>
+          <a:lstStyle/>
+          <a:p>
+            <a:pPr algn="l"/>
+            <a:endParaRPr lang="en-GB" dirty="0"/>
+          </a:p>
+          <a:p>
+            <a:pPr algn="l"/>
+            <a:endParaRPr lang="en-GB" dirty="0"/>
+          </a:p>
+          <a:p>
+            <a:pPr algn="l"/>
+            <a:endParaRPr lang="en-GB" dirty="0"/>
+          </a:p>
+          <a:p>
+            <a:pPr algn="l"/>
+            <a:endParaRPr lang="en-GB" dirty="0"/>
+          </a:p>
+          <a:p>
+            <a:pPr algn="l"/>
+            <a:endParaRPr lang="en-GB" dirty="0"/>
+          </a:p>
+          <a:p>
+            <a:pPr algn="l"/>
+            <a:r>
+              <a:rPr lang="en-GB" dirty="0"/>
+              <a:t>Homework do the Start Wars ship RLS many 2 many test.</a:t>
+            </a:r>
+          </a:p>
+          <a:p>
+            <a:pPr algn="l"/>
+            <a:endParaRPr lang="en-GB" dirty="0"/>
+          </a:p>
+          <a:p>
+            <a:pPr algn="l"/>
+            <a:r>
+              <a:rPr lang="en-GB" dirty="0"/>
+              <a:t>https://datachant.com/2017/06/03/rls-star-wars-power-bi-challenge/</a:t>
+            </a:r>
+          </a:p>
+        </p:txBody>
+      </p:sp>
+    </p:spTree>
+    <p:extLst>
+      <p:ext uri="{BB962C8B-B14F-4D97-AF65-F5344CB8AC3E}">
+        <p14:creationId xmlns:p14="http://schemas.microsoft.com/office/powerpoint/2010/main" val="1747997659"/>
+      </p:ext>
+    </p:extLst>
+  </p:cSld>
+  <p:clrMapOvr>
+    <a:masterClrMapping/>
+  </p:clrMapOvr>
+</p:sld>
+</file>
+
+<file path=ppt/slides/slide28.xml><?xml version="1.0" encoding="utf-8"?>
+<p:sld xmlns:a="http://schemas.openxmlformats.org/drawingml/2006/main" xmlns:r="http://schemas.openxmlformats.org/officeDocument/2006/relationships" xmlns:p="http://schemas.openxmlformats.org/presentationml/2006/main">
+  <p:cSld>
+    <p:spTree>
+      <p:nvGrpSpPr>
+        <p:cNvPr id="1" name=""/>
+        <p:cNvGrpSpPr/>
+        <p:nvPr/>
+      </p:nvGrpSpPr>
+      <p:grpSpPr>
+        <a:xfrm>
+          <a:off x="0" y="0"/>
+          <a:ext cx="0" cy="0"/>
+          <a:chOff x="0" y="0"/>
+          <a:chExt cx="0" cy="0"/>
+        </a:xfrm>
+      </p:grpSpPr>
+      <p:sp>
+        <p:nvSpPr>
+          <p:cNvPr id="2" name="Title 1">
+            <a:extLst>
+              <a:ext uri="{FF2B5EF4-FFF2-40B4-BE49-F238E27FC236}">
+                <a16:creationId xmlns:a16="http://schemas.microsoft.com/office/drawing/2014/main" id="{4F5FFE88-7B14-4763-806D-A2BFC137C899}"/>
+              </a:ext>
+            </a:extLst>
+          </p:cNvPr>
+          <p:cNvSpPr>
+            <a:spLocks noGrp="1"/>
+          </p:cNvSpPr>
+          <p:nvPr>
+            <p:ph type="ctrTitle"/>
+          </p:nvPr>
+        </p:nvSpPr>
+        <p:spPr>
+          <a:xfrm>
+            <a:off x="1428750" y="252414"/>
+            <a:ext cx="9144000" cy="656850"/>
+          </a:xfrm>
+        </p:spPr>
+        <p:txBody>
+          <a:bodyPr>
+            <a:normAutofit fontScale="90000"/>
+          </a:bodyPr>
+          <a:lstStyle/>
+          <a:p>
+            <a:r>
+              <a:rPr lang="en-GB" dirty="0"/>
+              <a:t>Power BI Int Email onboarding</a:t>
+            </a:r>
+          </a:p>
+        </p:txBody>
+      </p:sp>
+      <p:sp>
+        <p:nvSpPr>
+          <p:cNvPr id="3" name="Subtitle 2">
+            <a:extLst>
+              <a:ext uri="{FF2B5EF4-FFF2-40B4-BE49-F238E27FC236}">
+                <a16:creationId xmlns:a16="http://schemas.microsoft.com/office/drawing/2014/main" id="{EA597543-2A3A-4FD5-9DA6-D09EB6B64855}"/>
+              </a:ext>
+            </a:extLst>
+          </p:cNvPr>
+          <p:cNvSpPr>
+            <a:spLocks noGrp="1"/>
+          </p:cNvSpPr>
+          <p:nvPr>
+            <p:ph type="subTitle" idx="1"/>
+          </p:nvPr>
+        </p:nvSpPr>
+        <p:spPr>
+          <a:xfrm>
+            <a:off x="1524000" y="1063671"/>
+            <a:ext cx="9144000" cy="4435867"/>
+          </a:xfrm>
+        </p:spPr>
+        <p:txBody>
+          <a:bodyPr>
+            <a:normAutofit/>
+          </a:bodyPr>
+          <a:lstStyle/>
+          <a:p>
+            <a:pPr algn="l"/>
+            <a:r>
+              <a:rPr lang="en-GB" dirty="0"/>
+              <a:t>Issue email </a:t>
+            </a:r>
+            <a:r>
+              <a:rPr lang="en-GB" dirty="0">
+                <a:hlinkClick r:id="rId3"/>
+              </a:rPr>
+              <a:t>account@wottabyte.com</a:t>
+            </a:r>
+            <a:endParaRPr lang="en-GB" dirty="0"/>
+          </a:p>
+          <a:p>
+            <a:pPr algn="l"/>
+            <a:r>
+              <a:rPr lang="en-GB" dirty="0"/>
+              <a:t>Issue email onboarding instructions with webmail </a:t>
+            </a:r>
+          </a:p>
+          <a:p>
+            <a:pPr algn="l"/>
+            <a:r>
+              <a:rPr lang="en-GB" dirty="0"/>
+              <a:t>http://192.185.116.148:2095</a:t>
+            </a:r>
+          </a:p>
+          <a:p>
+            <a:pPr algn="l"/>
+            <a:r>
+              <a:rPr lang="en-GB" dirty="0"/>
+              <a:t>generic P@ssw0rd1</a:t>
+            </a:r>
+          </a:p>
+          <a:p>
+            <a:pPr algn="l"/>
+            <a:endParaRPr lang="en-GB" dirty="0"/>
+          </a:p>
+          <a:p>
+            <a:pPr algn="l"/>
+            <a:endParaRPr lang="en-GB" dirty="0"/>
+          </a:p>
+          <a:p>
+            <a:pPr algn="l"/>
+            <a:endParaRPr lang="en-GB" dirty="0"/>
+          </a:p>
+          <a:p>
+            <a:pPr algn="l"/>
+            <a:endParaRPr lang="en-GB" dirty="0"/>
+          </a:p>
+          <a:p>
+            <a:pPr algn="l"/>
+            <a:endParaRPr lang="en-GB" dirty="0"/>
+          </a:p>
+        </p:txBody>
+      </p:sp>
+    </p:spTree>
+    <p:extLst>
+      <p:ext uri="{BB962C8B-B14F-4D97-AF65-F5344CB8AC3E}">
+        <p14:creationId xmlns:p14="http://schemas.microsoft.com/office/powerpoint/2010/main" val="842503376"/>
+      </p:ext>
+    </p:extLst>
+  </p:cSld>
+  <p:clrMapOvr>
+    <a:masterClrMapping/>
+  </p:clrMapOvr>
+</p:sld>
+</file>
+
+<file path=ppt/slides/slide29.xml><?xml version="1.0" encoding="utf-8"?>
+<p:sld xmlns:a="http://schemas.openxmlformats.org/drawingml/2006/main" xmlns:r="http://schemas.openxmlformats.org/officeDocument/2006/relationships" xmlns:p="http://schemas.openxmlformats.org/presentationml/2006/main">
+  <p:cSld>
+    <p:spTree>
+      <p:nvGrpSpPr>
+        <p:cNvPr id="1" name=""/>
+        <p:cNvGrpSpPr/>
+        <p:nvPr/>
+      </p:nvGrpSpPr>
+      <p:grpSpPr>
+        <a:xfrm>
+          <a:off x="0" y="0"/>
+          <a:ext cx="0" cy="0"/>
+          <a:chOff x="0" y="0"/>
+          <a:chExt cx="0" cy="0"/>
+        </a:xfrm>
+      </p:grpSpPr>
+      <p:sp>
+        <p:nvSpPr>
+          <p:cNvPr id="2" name="Title 1">
+            <a:extLst>
+              <a:ext uri="{FF2B5EF4-FFF2-40B4-BE49-F238E27FC236}">
+                <a16:creationId xmlns:a16="http://schemas.microsoft.com/office/drawing/2014/main" id="{4F5FFE88-7B14-4763-806D-A2BFC137C899}"/>
+              </a:ext>
+            </a:extLst>
+          </p:cNvPr>
+          <p:cNvSpPr>
+            <a:spLocks noGrp="1"/>
+          </p:cNvSpPr>
+          <p:nvPr>
+            <p:ph type="ctrTitle"/>
+          </p:nvPr>
+        </p:nvSpPr>
+        <p:spPr>
+          <a:xfrm>
+            <a:off x="1428750" y="252413"/>
+            <a:ext cx="9144000" cy="759591"/>
+          </a:xfrm>
+        </p:spPr>
+        <p:txBody>
+          <a:bodyPr>
+            <a:normAutofit/>
+          </a:bodyPr>
+          <a:lstStyle/>
+          <a:p>
+            <a:r>
+              <a:rPr lang="en-GB" dirty="0"/>
+              <a:t>Power BI Lesson 5 of 6</a:t>
+            </a:r>
+          </a:p>
+        </p:txBody>
+      </p:sp>
+      <p:sp>
+        <p:nvSpPr>
+          <p:cNvPr id="3" name="Subtitle 2">
+            <a:extLst>
+              <a:ext uri="{FF2B5EF4-FFF2-40B4-BE49-F238E27FC236}">
+                <a16:creationId xmlns:a16="http://schemas.microsoft.com/office/drawing/2014/main" id="{EA597543-2A3A-4FD5-9DA6-D09EB6B64855}"/>
+              </a:ext>
+            </a:extLst>
+          </p:cNvPr>
+          <p:cNvSpPr>
+            <a:spLocks noGrp="1"/>
+          </p:cNvSpPr>
+          <p:nvPr>
+            <p:ph type="subTitle" idx="1"/>
+          </p:nvPr>
+        </p:nvSpPr>
+        <p:spPr>
+          <a:xfrm>
+            <a:off x="1524000" y="1063671"/>
+            <a:ext cx="9144000" cy="4435867"/>
+          </a:xfrm>
+        </p:spPr>
+        <p:txBody>
+          <a:bodyPr>
+            <a:normAutofit/>
+          </a:bodyPr>
+          <a:lstStyle/>
+          <a:p>
+            <a:pPr algn="l"/>
+            <a:endParaRPr lang="en-GB" dirty="0"/>
+          </a:p>
+          <a:p>
+            <a:pPr algn="l"/>
+            <a:r>
+              <a:rPr lang="en-GB" dirty="0"/>
+              <a:t>Lesson 5 Mon 11</a:t>
+            </a:r>
+            <a:r>
+              <a:rPr lang="en-GB" baseline="30000" dirty="0"/>
+              <a:t>th</a:t>
+            </a:r>
+            <a:r>
+              <a:rPr lang="en-GB" dirty="0"/>
+              <a:t> Feb 2019</a:t>
+            </a:r>
+          </a:p>
+          <a:p>
+            <a:pPr algn="l"/>
+            <a:r>
+              <a:rPr lang="en-GB" dirty="0" err="1"/>
+              <a:t>PowerBI</a:t>
+            </a:r>
+            <a:r>
+              <a:rPr lang="en-GB" dirty="0"/>
+              <a:t> AI features @ Microsoft Reactor NOT at We Work</a:t>
+            </a:r>
+          </a:p>
+          <a:p>
+            <a:pPr algn="l"/>
+            <a:r>
+              <a:rPr lang="en-GB" dirty="0"/>
+              <a:t>Register here:</a:t>
+            </a:r>
+          </a:p>
+          <a:p>
+            <a:pPr algn="l"/>
+            <a:r>
+              <a:rPr lang="en-GB" dirty="0"/>
+              <a:t>https://www.meetup.com/Power-BI-Data-Scientist-Artificial-Intelligence-Solutions/events/258666451/</a:t>
+            </a:r>
+          </a:p>
+          <a:p>
+            <a:pPr algn="l"/>
+            <a:endParaRPr lang="en-GB" dirty="0"/>
+          </a:p>
+        </p:txBody>
+      </p:sp>
+    </p:spTree>
+    <p:extLst>
+      <p:ext uri="{BB962C8B-B14F-4D97-AF65-F5344CB8AC3E}">
+        <p14:creationId xmlns:p14="http://schemas.microsoft.com/office/powerpoint/2010/main" val="462808949"/>
       </p:ext>
     </p:extLst>
   </p:cSld>
@@ -10278,6 +13141,487 @@
     <p:extLst>
       <p:ext uri="{BB962C8B-B14F-4D97-AF65-F5344CB8AC3E}">
         <p14:creationId xmlns:p14="http://schemas.microsoft.com/office/powerpoint/2010/main" val="2107091990"/>
+      </p:ext>
+    </p:extLst>
+  </p:cSld>
+  <p:clrMapOvr>
+    <a:masterClrMapping/>
+  </p:clrMapOvr>
+</p:sld>
+</file>
+
+<file path=ppt/slides/slide30.xml><?xml version="1.0" encoding="utf-8"?>
+<p:sld xmlns:a="http://schemas.openxmlformats.org/drawingml/2006/main" xmlns:r="http://schemas.openxmlformats.org/officeDocument/2006/relationships" xmlns:p="http://schemas.openxmlformats.org/presentationml/2006/main">
+  <p:cSld>
+    <p:spTree>
+      <p:nvGrpSpPr>
+        <p:cNvPr id="1" name=""/>
+        <p:cNvGrpSpPr/>
+        <p:nvPr/>
+      </p:nvGrpSpPr>
+      <p:grpSpPr>
+        <a:xfrm>
+          <a:off x="0" y="0"/>
+          <a:ext cx="0" cy="0"/>
+          <a:chOff x="0" y="0"/>
+          <a:chExt cx="0" cy="0"/>
+        </a:xfrm>
+      </p:grpSpPr>
+      <p:sp>
+        <p:nvSpPr>
+          <p:cNvPr id="2" name="Title 1">
+            <a:extLst>
+              <a:ext uri="{FF2B5EF4-FFF2-40B4-BE49-F238E27FC236}">
+                <a16:creationId xmlns:a16="http://schemas.microsoft.com/office/drawing/2014/main" id="{4F5FFE88-7B14-4763-806D-A2BFC137C899}"/>
+              </a:ext>
+            </a:extLst>
+          </p:cNvPr>
+          <p:cNvSpPr>
+            <a:spLocks noGrp="1"/>
+          </p:cNvSpPr>
+          <p:nvPr>
+            <p:ph type="ctrTitle"/>
+          </p:nvPr>
+        </p:nvSpPr>
+        <p:spPr>
+          <a:xfrm>
+            <a:off x="1428750" y="252414"/>
+            <a:ext cx="9144000" cy="656850"/>
+          </a:xfrm>
+        </p:spPr>
+        <p:txBody>
+          <a:bodyPr>
+            <a:normAutofit fontScale="90000"/>
+          </a:bodyPr>
+          <a:lstStyle/>
+          <a:p>
+            <a:r>
+              <a:rPr lang="en-GB" dirty="0"/>
+              <a:t>Power BI AI </a:t>
+            </a:r>
+          </a:p>
+        </p:txBody>
+      </p:sp>
+      <p:sp>
+        <p:nvSpPr>
+          <p:cNvPr id="3" name="Subtitle 2">
+            <a:extLst>
+              <a:ext uri="{FF2B5EF4-FFF2-40B4-BE49-F238E27FC236}">
+                <a16:creationId xmlns:a16="http://schemas.microsoft.com/office/drawing/2014/main" id="{EA597543-2A3A-4FD5-9DA6-D09EB6B64855}"/>
+              </a:ext>
+            </a:extLst>
+          </p:cNvPr>
+          <p:cNvSpPr>
+            <a:spLocks noGrp="1"/>
+          </p:cNvSpPr>
+          <p:nvPr>
+            <p:ph type="subTitle" idx="1"/>
+          </p:nvPr>
+        </p:nvSpPr>
+        <p:spPr>
+          <a:xfrm>
+            <a:off x="1524000" y="1063671"/>
+            <a:ext cx="9144000" cy="4435867"/>
+          </a:xfrm>
+        </p:spPr>
+        <p:txBody>
+          <a:bodyPr>
+            <a:normAutofit/>
+          </a:bodyPr>
+          <a:lstStyle/>
+          <a:p>
+            <a:pPr algn="l"/>
+            <a:endParaRPr lang="en-GB" dirty="0"/>
+          </a:p>
+          <a:p>
+            <a:pPr algn="l"/>
+            <a:r>
+              <a:rPr lang="en-GB" dirty="0"/>
+              <a:t>Microsoft is introducing four new AI-related features in Power BI:</a:t>
+            </a:r>
+          </a:p>
+          <a:p>
+            <a:pPr algn="l"/>
+            <a:r>
+              <a:rPr lang="en-GB" dirty="0"/>
+              <a:t>Integration of Azure Cognitive Services</a:t>
+            </a:r>
+          </a:p>
+          <a:p>
+            <a:pPr algn="l"/>
+            <a:r>
+              <a:rPr lang="en-GB" dirty="0"/>
+              <a:t>Integration of ML models hosted in Azure Machine Learning, including those built in Azure Databricks</a:t>
+            </a:r>
+          </a:p>
+          <a:p>
+            <a:pPr algn="l"/>
+            <a:r>
+              <a:rPr lang="en-GB" dirty="0"/>
+              <a:t>The ability to create, and then use, ML models using </a:t>
+            </a:r>
+            <a:r>
+              <a:rPr lang="en-GB" dirty="0">
+                <a:hlinkClick r:id="rId3"/>
+              </a:rPr>
+              <a:t>Azure Automated ML</a:t>
+            </a:r>
+            <a:r>
+              <a:rPr lang="en-GB" dirty="0"/>
+              <a:t> (</a:t>
+            </a:r>
+            <a:r>
+              <a:rPr lang="en-GB" dirty="0" err="1"/>
+              <a:t>AutoML</a:t>
+            </a:r>
+            <a:r>
+              <a:rPr lang="en-GB" dirty="0"/>
+              <a:t>)</a:t>
+            </a:r>
+          </a:p>
+          <a:p>
+            <a:pPr algn="l"/>
+            <a:r>
+              <a:rPr lang="en-GB" dirty="0"/>
+              <a:t>A new Key Driver Analysis visualization that reveals which columns and values drive specific outcomes (values) for data columns serving as measures or Key Performance Indicators (KPIs)</a:t>
+            </a:r>
+          </a:p>
+          <a:p>
+            <a:pPr algn="l"/>
+            <a:endParaRPr lang="en-GB" dirty="0"/>
+          </a:p>
+          <a:p>
+            <a:pPr algn="l"/>
+            <a:endParaRPr lang="en-GB" dirty="0"/>
+          </a:p>
+          <a:p>
+            <a:pPr algn="l"/>
+            <a:endParaRPr lang="en-GB" dirty="0"/>
+          </a:p>
+        </p:txBody>
+      </p:sp>
+    </p:spTree>
+    <p:extLst>
+      <p:ext uri="{BB962C8B-B14F-4D97-AF65-F5344CB8AC3E}">
+        <p14:creationId xmlns:p14="http://schemas.microsoft.com/office/powerpoint/2010/main" val="1525929478"/>
+      </p:ext>
+    </p:extLst>
+  </p:cSld>
+  <p:clrMapOvr>
+    <a:masterClrMapping/>
+  </p:clrMapOvr>
+</p:sld>
+</file>
+
+<file path=ppt/slides/slide31.xml><?xml version="1.0" encoding="utf-8"?>
+<p:sld xmlns:a="http://schemas.openxmlformats.org/drawingml/2006/main" xmlns:r="http://schemas.openxmlformats.org/officeDocument/2006/relationships" xmlns:p="http://schemas.openxmlformats.org/presentationml/2006/main">
+  <p:cSld>
+    <p:spTree>
+      <p:nvGrpSpPr>
+        <p:cNvPr id="1" name=""/>
+        <p:cNvGrpSpPr/>
+        <p:nvPr/>
+      </p:nvGrpSpPr>
+      <p:grpSpPr>
+        <a:xfrm>
+          <a:off x="0" y="0"/>
+          <a:ext cx="0" cy="0"/>
+          <a:chOff x="0" y="0"/>
+          <a:chExt cx="0" cy="0"/>
+        </a:xfrm>
+      </p:grpSpPr>
+      <p:sp>
+        <p:nvSpPr>
+          <p:cNvPr id="2" name="Title 1">
+            <a:extLst>
+              <a:ext uri="{FF2B5EF4-FFF2-40B4-BE49-F238E27FC236}">
+                <a16:creationId xmlns:a16="http://schemas.microsoft.com/office/drawing/2014/main" id="{4F5FFE88-7B14-4763-806D-A2BFC137C899}"/>
+              </a:ext>
+            </a:extLst>
+          </p:cNvPr>
+          <p:cNvSpPr>
+            <a:spLocks noGrp="1"/>
+          </p:cNvSpPr>
+          <p:nvPr>
+            <p:ph type="ctrTitle"/>
+          </p:nvPr>
+        </p:nvSpPr>
+        <p:spPr>
+          <a:xfrm>
+            <a:off x="1428750" y="252414"/>
+            <a:ext cx="9144000" cy="656850"/>
+          </a:xfrm>
+        </p:spPr>
+        <p:txBody>
+          <a:bodyPr>
+            <a:normAutofit fontScale="90000"/>
+          </a:bodyPr>
+          <a:lstStyle/>
+          <a:p>
+            <a:r>
+              <a:rPr lang="en-GB" dirty="0"/>
+              <a:t>Power BI &amp; R</a:t>
+            </a:r>
+          </a:p>
+        </p:txBody>
+      </p:sp>
+      <p:sp>
+        <p:nvSpPr>
+          <p:cNvPr id="3" name="Subtitle 2">
+            <a:extLst>
+              <a:ext uri="{FF2B5EF4-FFF2-40B4-BE49-F238E27FC236}">
+                <a16:creationId xmlns:a16="http://schemas.microsoft.com/office/drawing/2014/main" id="{EA597543-2A3A-4FD5-9DA6-D09EB6B64855}"/>
+              </a:ext>
+            </a:extLst>
+          </p:cNvPr>
+          <p:cNvSpPr>
+            <a:spLocks noGrp="1"/>
+          </p:cNvSpPr>
+          <p:nvPr>
+            <p:ph type="subTitle" idx="1"/>
+          </p:nvPr>
+        </p:nvSpPr>
+        <p:spPr>
+          <a:xfrm>
+            <a:off x="1524000" y="1063671"/>
+            <a:ext cx="9144000" cy="4435867"/>
+          </a:xfrm>
+        </p:spPr>
+        <p:txBody>
+          <a:bodyPr>
+            <a:normAutofit/>
+          </a:bodyPr>
+          <a:lstStyle/>
+          <a:p>
+            <a:pPr algn="l"/>
+            <a:endParaRPr lang="en-GB" dirty="0"/>
+          </a:p>
+          <a:p>
+            <a:pPr algn="l"/>
+            <a:endParaRPr lang="en-GB" dirty="0"/>
+          </a:p>
+          <a:p>
+            <a:pPr algn="l"/>
+            <a:endParaRPr lang="en-GB" dirty="0"/>
+          </a:p>
+        </p:txBody>
+      </p:sp>
+    </p:spTree>
+    <p:extLst>
+      <p:ext uri="{BB962C8B-B14F-4D97-AF65-F5344CB8AC3E}">
+        <p14:creationId xmlns:p14="http://schemas.microsoft.com/office/powerpoint/2010/main" val="436745474"/>
+      </p:ext>
+    </p:extLst>
+  </p:cSld>
+  <p:clrMapOvr>
+    <a:masterClrMapping/>
+  </p:clrMapOvr>
+</p:sld>
+</file>
+
+<file path=ppt/slides/slide32.xml><?xml version="1.0" encoding="utf-8"?>
+<p:sld xmlns:a="http://schemas.openxmlformats.org/drawingml/2006/main" xmlns:r="http://schemas.openxmlformats.org/officeDocument/2006/relationships" xmlns:p="http://schemas.openxmlformats.org/presentationml/2006/main">
+  <p:cSld>
+    <p:spTree>
+      <p:nvGrpSpPr>
+        <p:cNvPr id="1" name=""/>
+        <p:cNvGrpSpPr/>
+        <p:nvPr/>
+      </p:nvGrpSpPr>
+      <p:grpSpPr>
+        <a:xfrm>
+          <a:off x="0" y="0"/>
+          <a:ext cx="0" cy="0"/>
+          <a:chOff x="0" y="0"/>
+          <a:chExt cx="0" cy="0"/>
+        </a:xfrm>
+      </p:grpSpPr>
+      <p:sp>
+        <p:nvSpPr>
+          <p:cNvPr id="2" name="Title 1">
+            <a:extLst>
+              <a:ext uri="{FF2B5EF4-FFF2-40B4-BE49-F238E27FC236}">
+                <a16:creationId xmlns:a16="http://schemas.microsoft.com/office/drawing/2014/main" id="{4F5FFE88-7B14-4763-806D-A2BFC137C899}"/>
+              </a:ext>
+            </a:extLst>
+          </p:cNvPr>
+          <p:cNvSpPr>
+            <a:spLocks noGrp="1"/>
+          </p:cNvSpPr>
+          <p:nvPr>
+            <p:ph type="ctrTitle"/>
+          </p:nvPr>
+        </p:nvSpPr>
+        <p:spPr>
+          <a:xfrm>
+            <a:off x="1428750" y="252414"/>
+            <a:ext cx="9144000" cy="656850"/>
+          </a:xfrm>
+        </p:spPr>
+        <p:txBody>
+          <a:bodyPr>
+            <a:normAutofit fontScale="90000"/>
+          </a:bodyPr>
+          <a:lstStyle/>
+          <a:p>
+            <a:r>
+              <a:rPr lang="en-GB" dirty="0"/>
+              <a:t>Power BI Python</a:t>
+            </a:r>
+          </a:p>
+        </p:txBody>
+      </p:sp>
+      <p:sp>
+        <p:nvSpPr>
+          <p:cNvPr id="3" name="Subtitle 2">
+            <a:extLst>
+              <a:ext uri="{FF2B5EF4-FFF2-40B4-BE49-F238E27FC236}">
+                <a16:creationId xmlns:a16="http://schemas.microsoft.com/office/drawing/2014/main" id="{EA597543-2A3A-4FD5-9DA6-D09EB6B64855}"/>
+              </a:ext>
+            </a:extLst>
+          </p:cNvPr>
+          <p:cNvSpPr>
+            <a:spLocks noGrp="1"/>
+          </p:cNvSpPr>
+          <p:nvPr>
+            <p:ph type="subTitle" idx="1"/>
+          </p:nvPr>
+        </p:nvSpPr>
+        <p:spPr>
+          <a:xfrm>
+            <a:off x="1524000" y="1063671"/>
+            <a:ext cx="9144000" cy="4435867"/>
+          </a:xfrm>
+        </p:spPr>
+        <p:txBody>
+          <a:bodyPr>
+            <a:normAutofit/>
+          </a:bodyPr>
+          <a:lstStyle/>
+          <a:p>
+            <a:pPr algn="l"/>
+            <a:endParaRPr lang="en-GB" dirty="0"/>
+          </a:p>
+          <a:p>
+            <a:pPr algn="l"/>
+            <a:endParaRPr lang="en-GB" dirty="0"/>
+          </a:p>
+          <a:p>
+            <a:pPr algn="l"/>
+            <a:endParaRPr lang="en-GB" dirty="0"/>
+          </a:p>
+        </p:txBody>
+      </p:sp>
+    </p:spTree>
+    <p:extLst>
+      <p:ext uri="{BB962C8B-B14F-4D97-AF65-F5344CB8AC3E}">
+        <p14:creationId xmlns:p14="http://schemas.microsoft.com/office/powerpoint/2010/main" val="4234575051"/>
+      </p:ext>
+    </p:extLst>
+  </p:cSld>
+  <p:clrMapOvr>
+    <a:masterClrMapping/>
+  </p:clrMapOvr>
+</p:sld>
+</file>
+
+<file path=ppt/slides/slide33.xml><?xml version="1.0" encoding="utf-8"?>
+<p:sld xmlns:a="http://schemas.openxmlformats.org/drawingml/2006/main" xmlns:r="http://schemas.openxmlformats.org/officeDocument/2006/relationships" xmlns:p="http://schemas.openxmlformats.org/presentationml/2006/main">
+  <p:cSld>
+    <p:spTree>
+      <p:nvGrpSpPr>
+        <p:cNvPr id="1" name=""/>
+        <p:cNvGrpSpPr/>
+        <p:nvPr/>
+      </p:nvGrpSpPr>
+      <p:grpSpPr>
+        <a:xfrm>
+          <a:off x="0" y="0"/>
+          <a:ext cx="0" cy="0"/>
+          <a:chOff x="0" y="0"/>
+          <a:chExt cx="0" cy="0"/>
+        </a:xfrm>
+      </p:grpSpPr>
+      <p:sp>
+        <p:nvSpPr>
+          <p:cNvPr id="2" name="Title 1">
+            <a:extLst>
+              <a:ext uri="{FF2B5EF4-FFF2-40B4-BE49-F238E27FC236}">
+                <a16:creationId xmlns:a16="http://schemas.microsoft.com/office/drawing/2014/main" id="{4F5FFE88-7B14-4763-806D-A2BFC137C899}"/>
+              </a:ext>
+            </a:extLst>
+          </p:cNvPr>
+          <p:cNvSpPr>
+            <a:spLocks noGrp="1"/>
+          </p:cNvSpPr>
+          <p:nvPr>
+            <p:ph type="ctrTitle"/>
+          </p:nvPr>
+        </p:nvSpPr>
+        <p:spPr>
+          <a:xfrm>
+            <a:off x="1428750" y="252414"/>
+            <a:ext cx="9144000" cy="656850"/>
+          </a:xfrm>
+        </p:spPr>
+        <p:txBody>
+          <a:bodyPr>
+            <a:normAutofit fontScale="90000"/>
+          </a:bodyPr>
+          <a:lstStyle/>
+          <a:p>
+            <a:r>
+              <a:rPr lang="en-GB" dirty="0"/>
+              <a:t>Power BI Azure Machine Learning</a:t>
+            </a:r>
+          </a:p>
+        </p:txBody>
+      </p:sp>
+      <p:sp>
+        <p:nvSpPr>
+          <p:cNvPr id="3" name="Subtitle 2">
+            <a:extLst>
+              <a:ext uri="{FF2B5EF4-FFF2-40B4-BE49-F238E27FC236}">
+                <a16:creationId xmlns:a16="http://schemas.microsoft.com/office/drawing/2014/main" id="{EA597543-2A3A-4FD5-9DA6-D09EB6B64855}"/>
+              </a:ext>
+            </a:extLst>
+          </p:cNvPr>
+          <p:cNvSpPr>
+            <a:spLocks noGrp="1"/>
+          </p:cNvSpPr>
+          <p:nvPr>
+            <p:ph type="subTitle" idx="1"/>
+          </p:nvPr>
+        </p:nvSpPr>
+        <p:spPr>
+          <a:xfrm>
+            <a:off x="1524000" y="1063671"/>
+            <a:ext cx="9144000" cy="4435867"/>
+          </a:xfrm>
+        </p:spPr>
+        <p:txBody>
+          <a:bodyPr>
+            <a:normAutofit/>
+          </a:bodyPr>
+          <a:lstStyle/>
+          <a:p>
+            <a:pPr algn="l"/>
+            <a:endParaRPr lang="en-GB" dirty="0"/>
+          </a:p>
+          <a:p>
+            <a:pPr algn="l"/>
+            <a:endParaRPr lang="en-GB" dirty="0"/>
+          </a:p>
+          <a:p>
+            <a:pPr algn="l"/>
+            <a:endParaRPr lang="en-GB" dirty="0"/>
+          </a:p>
+        </p:txBody>
+      </p:sp>
+    </p:spTree>
+    <p:extLst>
+      <p:ext uri="{BB962C8B-B14F-4D97-AF65-F5344CB8AC3E}">
+        <p14:creationId xmlns:p14="http://schemas.microsoft.com/office/powerpoint/2010/main" val="3459993194"/>
       </p:ext>
     </p:extLst>
   </p:cSld>

</xml_diff>